<commit_message>
Revised fundamentals in data-viz-01
</commit_message>
<xml_diff>
--- a/data-viz-01/component/fundamentals.pptx
+++ b/data-viz-01/component/fundamentals.pptx
@@ -5,7 +5,7 @@
     <p:sldMasterId id="2147483648" r:id="rId1"/>
   </p:sldMasterIdLst>
   <p:notesMasterIdLst>
-    <p:NotesMasterId r:id="rId40"/>
+    <p:NotesMasterId r:id="rId22"/>
   </p:notesMasterIdLst>
   <p:sldIdLst>
     <p:sldId id="256" r:id="rId2"/>
@@ -28,24 +28,6 @@
     <p:sldId id="273" r:id="rId19"/>
     <p:sldId id="274" r:id="rId20"/>
     <p:sldId id="275" r:id="rId21"/>
-    <p:sldId id="276" r:id="rId22"/>
-    <p:sldId id="277" r:id="rId23"/>
-    <p:sldId id="278" r:id="rId24"/>
-    <p:sldId id="279" r:id="rId25"/>
-    <p:sldId id="280" r:id="rId26"/>
-    <p:sldId id="281" r:id="rId27"/>
-    <p:sldId id="282" r:id="rId28"/>
-    <p:sldId id="283" r:id="rId29"/>
-    <p:sldId id="284" r:id="rId30"/>
-    <p:sldId id="285" r:id="rId31"/>
-    <p:sldId id="286" r:id="rId32"/>
-    <p:sldId id="287" r:id="rId33"/>
-    <p:sldId id="288" r:id="rId34"/>
-    <p:sldId id="289" r:id="rId35"/>
-    <p:sldId id="290" r:id="rId36"/>
-    <p:sldId id="291" r:id="rId37"/>
-    <p:sldId id="292" r:id="rId38"/>
-    <p:sldId id="293" r:id="rId39"/>
   </p:sldIdLst>
   <p:sldSz cx="9144000" cy="6858000" type="screen4x3"/>
   <p:notesSz cx="6858000" cy="9144000"/>
@@ -883,442 +865,6 @@
 </p:notes>
 </file>
 
-<file path=ppt/notesSlides/notesSlide10.xml><?xml version="1.0" encoding="utf-8"?>
-<p:notes xmlns:a="http://schemas.openxmlformats.org/drawingml/2006/main" xmlns:r="http://schemas.openxmlformats.org/officeDocument/2006/relationships" xmlns:p="http://schemas.openxmlformats.org/presentationml/2006/main">
-  <p:cSld>
-    <p:spTree>
-      <p:nvGrpSpPr>
-        <p:cNvPr id="1" name=""/>
-        <p:cNvGrpSpPr/>
-        <p:nvPr/>
-      </p:nvGrpSpPr>
-      <p:grpSpPr>
-        <a:xfrm>
-          <a:off x="0" y="0"/>
-          <a:ext cx="0" cy="0"/>
-          <a:chOff x="0" y="0"/>
-          <a:chExt cx="0" cy="0"/>
-        </a:xfrm>
-      </p:grpSpPr>
-      <p:sp>
-        <p:nvSpPr>
-          <p:cNvPr id="2" name="Slide Image Placeholder 1"/>
-          <p:cNvSpPr>
-            <a:spLocks noGrp="1" noRot="1" noChangeAspect="1"/>
-          </p:cNvSpPr>
-          <p:nvPr>
-            <p:ph type="sldImg"/>
-          </p:nvPr>
-        </p:nvSpPr>
-        <p:spPr/>
-      </p:sp>
-      <p:sp>
-        <p:nvSpPr>
-          <p:cNvPr id="3" name="Notes Placeholder 2"/>
-          <p:cNvSpPr>
-            <a:spLocks noGrp="1"/>
-          </p:cNvSpPr>
-          <p:nvPr>
-            <p:ph type="body" idx="1"/>
-          </p:nvPr>
-        </p:nvSpPr>
-        <p:spPr/>
-        <p:txBody>
-          <a:bodyPr/>
-          <a:lstStyle/>
-          <a:p>
-            <a:pPr lvl="0" marL="0" indent="0">
-              <a:buNone/>
-            </a:pPr>
-            <a:r>
-              <a:rPr/>
-              <a:t>This</a:t>
-            </a:r>
-            <a:r>
-              <a:rPr/>
-              <a:t> </a:t>
-            </a:r>
-            <a:r>
-              <a:rPr/>
-              <a:t>plot</a:t>
-            </a:r>
-            <a:r>
-              <a:rPr/>
-              <a:t> </a:t>
-            </a:r>
-            <a:r>
-              <a:rPr/>
-              <a:t>shows</a:t>
-            </a:r>
-            <a:r>
-              <a:rPr/>
-              <a:t> </a:t>
-            </a:r>
-            <a:r>
-              <a:rPr/>
-              <a:t>a</a:t>
-            </a:r>
-            <a:r>
-              <a:rPr/>
-              <a:t> </a:t>
-            </a:r>
-            <a:r>
-              <a:rPr/>
-              <a:t>blue</a:t>
-            </a:r>
-            <a:r>
-              <a:rPr/>
-              <a:t> </a:t>
-            </a:r>
-            <a:r>
-              <a:rPr/>
-              <a:t>point</a:t>
-            </a:r>
-            <a:r>
-              <a:rPr/>
-              <a:t> </a:t>
-            </a:r>
-            <a:r>
-              <a:rPr/>
-              <a:t>representing</a:t>
-            </a:r>
-            <a:r>
-              <a:rPr/>
-              <a:t> </a:t>
-            </a:r>
-            <a:r>
-              <a:rPr/>
-              <a:t>a</a:t>
-            </a:r>
-            <a:r>
-              <a:rPr/>
-              <a:t> </a:t>
-            </a:r>
-            <a:r>
-              <a:rPr/>
-              <a:t>four</a:t>
-            </a:r>
-            <a:r>
-              <a:rPr/>
-              <a:t> </a:t>
-            </a:r>
-            <a:r>
-              <a:rPr/>
-              <a:t>bathroom</a:t>
-            </a:r>
-            <a:r>
-              <a:rPr/>
-              <a:t> </a:t>
-            </a:r>
-            <a:r>
-              <a:rPr/>
-              <a:t>house</a:t>
-            </a:r>
-            <a:r>
-              <a:rPr/>
-              <a:t> </a:t>
-            </a:r>
-            <a:r>
-              <a:rPr/>
-              <a:t>in</a:t>
-            </a:r>
-            <a:r>
-              <a:rPr/>
-              <a:t> </a:t>
-            </a:r>
-            <a:r>
-              <a:rPr/>
-              <a:t>the</a:t>
-            </a:r>
-            <a:r>
-              <a:rPr/>
-              <a:t> </a:t>
-            </a:r>
-            <a:r>
-              <a:rPr/>
-              <a:t>upper</a:t>
-            </a:r>
-            <a:r>
-              <a:rPr/>
-              <a:t> </a:t>
-            </a:r>
-            <a:r>
-              <a:rPr/>
-              <a:t>left</a:t>
-            </a:r>
-            <a:r>
-              <a:rPr/>
-              <a:t> </a:t>
-            </a:r>
-            <a:r>
-              <a:rPr/>
-              <a:t>corner</a:t>
-            </a:r>
-            <a:r>
-              <a:rPr/>
-              <a:t> </a:t>
-            </a:r>
-            <a:r>
-              <a:rPr/>
-              <a:t>and</a:t>
-            </a:r>
-            <a:r>
-              <a:rPr/>
-              <a:t> </a:t>
-            </a:r>
-            <a:r>
-              <a:rPr/>
-              <a:t>an</a:t>
-            </a:r>
-            <a:r>
-              <a:rPr/>
-              <a:t> </a:t>
-            </a:r>
-            <a:r>
-              <a:rPr/>
-              <a:t>orange</a:t>
-            </a:r>
-            <a:r>
-              <a:rPr/>
-              <a:t> </a:t>
-            </a:r>
-            <a:r>
-              <a:rPr/>
-              <a:t>point</a:t>
-            </a:r>
-            <a:r>
-              <a:rPr/>
-              <a:t> </a:t>
-            </a:r>
-            <a:r>
-              <a:rPr/>
-              <a:t>representing</a:t>
-            </a:r>
-            <a:r>
-              <a:rPr/>
-              <a:t> </a:t>
-            </a:r>
-            <a:r>
-              <a:rPr/>
-              <a:t>a</a:t>
-            </a:r>
-            <a:r>
-              <a:rPr/>
-              <a:t> </a:t>
-            </a:r>
-            <a:r>
-              <a:rPr/>
-              <a:t>two</a:t>
-            </a:r>
-            <a:r>
-              <a:rPr/>
-              <a:t> </a:t>
-            </a:r>
-            <a:r>
-              <a:rPr/>
-              <a:t>bathroom</a:t>
-            </a:r>
-            <a:r>
-              <a:rPr/>
-              <a:t> </a:t>
-            </a:r>
-            <a:r>
-              <a:rPr/>
-              <a:t>house</a:t>
-            </a:r>
-            <a:r>
-              <a:rPr/>
-              <a:t> </a:t>
-            </a:r>
-            <a:r>
-              <a:rPr/>
-              <a:t>in</a:t>
-            </a:r>
-            <a:r>
-              <a:rPr/>
-              <a:t> </a:t>
-            </a:r>
-            <a:r>
-              <a:rPr/>
-              <a:t>the</a:t>
-            </a:r>
-            <a:r>
-              <a:rPr/>
-              <a:t> </a:t>
-            </a:r>
-            <a:r>
-              <a:rPr/>
-              <a:t>lower</a:t>
-            </a:r>
-            <a:r>
-              <a:rPr/>
-              <a:t> </a:t>
-            </a:r>
-            <a:r>
-              <a:rPr/>
-              <a:t>right</a:t>
-            </a:r>
-            <a:r>
-              <a:rPr/>
-              <a:t> </a:t>
-            </a:r>
-            <a:r>
-              <a:rPr/>
-              <a:t>corner.</a:t>
-            </a:r>
-          </a:p>
-        </p:txBody>
-      </p:sp>
-      <p:sp>
-        <p:nvSpPr>
-          <p:cNvPr id="4" name="Slide Number Placeholder 3"/>
-          <p:cNvSpPr>
-            <a:spLocks noGrp="1"/>
-          </p:cNvSpPr>
-          <p:nvPr>
-            <p:ph type="sldNum" sz="quarter" idx="10"/>
-          </p:nvPr>
-        </p:nvSpPr>
-        <p:spPr/>
-        <p:txBody>
-          <a:bodyPr/>
-          <a:lstStyle/>
-          <a:p>
-            <a:fld id="{18BDFEC3-8487-43E8-A154-7C12CBC1FFF2}" type="slidenum">
-              <a:rPr lang="en-US"/>
-              <a:t>30</a:t>
-            </a:fld>
-            <a:endParaRPr lang="en-US"/>
-          </a:p>
-        </p:txBody>
-      </p:sp>
-    </p:spTree>
-  </p:cSld>
-</p:notes>
-</file>
-
-<file path=ppt/notesSlides/notesSlide11.xml><?xml version="1.0" encoding="utf-8"?>
-<p:notes xmlns:a="http://schemas.openxmlformats.org/drawingml/2006/main" xmlns:r="http://schemas.openxmlformats.org/officeDocument/2006/relationships" xmlns:p="http://schemas.openxmlformats.org/presentationml/2006/main">
-  <p:cSld>
-    <p:spTree>
-      <p:nvGrpSpPr>
-        <p:cNvPr id="1" name=""/>
-        <p:cNvGrpSpPr/>
-        <p:nvPr/>
-      </p:nvGrpSpPr>
-      <p:grpSpPr>
-        <a:xfrm>
-          <a:off x="0" y="0"/>
-          <a:ext cx="0" cy="0"/>
-          <a:chOff x="0" y="0"/>
-          <a:chExt cx="0" cy="0"/>
-        </a:xfrm>
-      </p:grpSpPr>
-      <p:sp>
-        <p:nvSpPr>
-          <p:cNvPr id="2" name="Slide Image Placeholder 1"/>
-          <p:cNvSpPr>
-            <a:spLocks noGrp="1" noRot="1" noChangeAspect="1"/>
-          </p:cNvSpPr>
-          <p:nvPr>
-            <p:ph type="sldImg"/>
-          </p:nvPr>
-        </p:nvSpPr>
-        <p:spPr/>
-      </p:sp>
-      <p:sp>
-        <p:nvSpPr>
-          <p:cNvPr id="3" name="Notes Placeholder 2"/>
-          <p:cNvSpPr>
-            <a:spLocks noGrp="1"/>
-          </p:cNvSpPr>
-          <p:nvPr>
-            <p:ph type="body" idx="1"/>
-          </p:nvPr>
-        </p:nvSpPr>
-        <p:spPr/>
-        <p:txBody>
-          <a:bodyPr/>
-          <a:lstStyle/>
-          <a:p>
-            <a:pPr lvl="0" marL="0" indent="0">
-              <a:buNone/>
-            </a:pPr>
-            <a:r>
-              <a:rPr/>
-              <a:t>Notice</a:t>
-            </a:r>
-            <a:r>
-              <a:rPr/>
-              <a:t> </a:t>
-            </a:r>
-            <a:r>
-              <a:rPr/>
-              <a:t>how</a:t>
-            </a:r>
-            <a:r>
-              <a:rPr/>
-              <a:t> </a:t>
-            </a:r>
-            <a:r>
-              <a:rPr/>
-              <a:t>the</a:t>
-            </a:r>
-            <a:r>
-              <a:rPr/>
-              <a:t> </a:t>
-            </a:r>
-            <a:r>
-              <a:rPr/>
-              <a:t>legend</a:t>
-            </a:r>
-            <a:r>
-              <a:rPr/>
-              <a:t> </a:t>
-            </a:r>
-            <a:r>
-              <a:rPr/>
-              <a:t>has</a:t>
-            </a:r>
-            <a:r>
-              <a:rPr/>
-              <a:t> </a:t>
-            </a:r>
-            <a:r>
-              <a:rPr/>
-              <a:t>changed.</a:t>
-            </a:r>
-          </a:p>
-        </p:txBody>
-      </p:sp>
-      <p:sp>
-        <p:nvSpPr>
-          <p:cNvPr id="4" name="Slide Number Placeholder 3"/>
-          <p:cNvSpPr>
-            <a:spLocks noGrp="1"/>
-          </p:cNvSpPr>
-          <p:nvPr>
-            <p:ph type="sldNum" sz="quarter" idx="10"/>
-          </p:nvPr>
-        </p:nvSpPr>
-        <p:spPr/>
-        <p:txBody>
-          <a:bodyPr/>
-          <a:lstStyle/>
-          <a:p>
-            <a:fld id="{18BDFEC3-8487-43E8-A154-7C12CBC1FFF2}" type="slidenum">
-              <a:rPr lang="en-US"/>
-              <a:t>31</a:t>
-            </a:fld>
-            <a:endParaRPr lang="en-US"/>
-          </a:p>
-        </p:txBody>
-      </p:sp>
-    </p:spTree>
-  </p:cSld>
-</p:notes>
-</file>
-
 <file path=ppt/notesSlides/notesSlide2.xml><?xml version="1.0" encoding="utf-8"?>
 <p:notes xmlns:a="http://schemas.openxmlformats.org/drawingml/2006/main" xmlns:r="http://schemas.openxmlformats.org/officeDocument/2006/relationships" xmlns:p="http://schemas.openxmlformats.org/presentationml/2006/main">
   <p:cSld>
@@ -4026,6 +3572,118 @@
             </a:pPr>
             <a:r>
               <a:rPr/>
+              <a:t>You</a:t>
+            </a:r>
+            <a:r>
+              <a:rPr/>
+              <a:t> </a:t>
+            </a:r>
+            <a:r>
+              <a:rPr/>
+              <a:t>can</a:t>
+            </a:r>
+            <a:r>
+              <a:rPr/>
+              <a:t> </a:t>
+            </a:r>
+            <a:r>
+              <a:rPr/>
+              <a:t>also</a:t>
+            </a:r>
+            <a:r>
+              <a:rPr/>
+              <a:t> </a:t>
+            </a:r>
+            <a:r>
+              <a:rPr/>
+              <a:t>use</a:t>
+            </a:r>
+            <a:r>
+              <a:rPr/>
+              <a:t> </a:t>
+            </a:r>
+            <a:r>
+              <a:rPr/>
+              <a:t>the</a:t>
+            </a:r>
+            <a:r>
+              <a:rPr/>
+              <a:t> </a:t>
+            </a:r>
+            <a:r>
+              <a:rPr/>
+              <a:t>size</a:t>
+            </a:r>
+            <a:r>
+              <a:rPr/>
+              <a:t> </a:t>
+            </a:r>
+            <a:r>
+              <a:rPr/>
+              <a:t>of</a:t>
+            </a:r>
+            <a:r>
+              <a:rPr/>
+              <a:t> </a:t>
+            </a:r>
+            <a:r>
+              <a:rPr/>
+              <a:t>a</a:t>
+            </a:r>
+            <a:r>
+              <a:rPr/>
+              <a:t> </a:t>
+            </a:r>
+            <a:r>
+              <a:rPr/>
+              <a:t>point</a:t>
+            </a:r>
+            <a:r>
+              <a:rPr/>
+              <a:t> </a:t>
+            </a:r>
+            <a:r>
+              <a:rPr/>
+              <a:t>to</a:t>
+            </a:r>
+            <a:r>
+              <a:rPr/>
+              <a:t> </a:t>
+            </a:r>
+            <a:r>
+              <a:rPr/>
+              <a:t>represent</a:t>
+            </a:r>
+            <a:r>
+              <a:rPr/>
+              <a:t> </a:t>
+            </a:r>
+            <a:r>
+              <a:rPr/>
+              <a:t>a</a:t>
+            </a:r>
+            <a:r>
+              <a:rPr/>
+              <a:t> </a:t>
+            </a:r>
+            <a:r>
+              <a:rPr/>
+              <a:t>third</a:t>
+            </a:r>
+            <a:r>
+              <a:rPr/>
+              <a:t> </a:t>
+            </a:r>
+            <a:r>
+              <a:rPr/>
+              <a:t>dimension.</a:t>
+            </a:r>
+            <a:r>
+              <a:rPr/>
+              <a:t> </a:t>
+            </a:r>
+            <a:r>
+              <a:rPr/>
               <a:t>Here</a:t>
             </a:r>
             <a:r>
@@ -4042,7 +3700,23 @@
             </a:r>
             <a:r>
               <a:rPr/>
-              <a:t>what</a:t>
+              <a:t>a</a:t>
+            </a:r>
+            <a:r>
+              <a:rPr/>
+              <a:t> </a:t>
+            </a:r>
+            <a:r>
+              <a:rPr/>
+              <a:t>plot</a:t>
+            </a:r>
+            <a:r>
+              <a:rPr/>
+              <a:t> </a:t>
+            </a:r>
+            <a:r>
+              <a:rPr/>
+              <a:t>where</a:t>
             </a:r>
             <a:r>
               <a:rPr/>
@@ -4058,111 +3732,31 @@
             </a:r>
             <a:r>
               <a:rPr/>
-              <a:t>R</a:t>
-            </a:r>
-            <a:r>
-              <a:rPr/>
-              <a:t> </a:t>
-            </a:r>
-            <a:r>
-              <a:rPr/>
-              <a:t>graph</a:t>
-            </a:r>
-            <a:r>
-              <a:rPr/>
-              <a:t> </a:t>
-            </a:r>
-            <a:r>
-              <a:rPr/>
-              <a:t>looks</a:t>
-            </a:r>
-            <a:r>
-              <a:rPr/>
-              <a:t> </a:t>
-            </a:r>
-            <a:r>
-              <a:rPr/>
-              <a:t>like.</a:t>
-            </a:r>
-            <a:r>
-              <a:rPr/>
-              <a:t> </a:t>
-            </a:r>
-            <a:r>
-              <a:rPr/>
-              <a:t>I</a:t>
-            </a:r>
-            <a:r>
-              <a:rPr/>
-              <a:t> </a:t>
-            </a:r>
-            <a:r>
-              <a:rPr/>
-              <a:t>don’t</a:t>
-            </a:r>
-            <a:r>
-              <a:rPr/>
-              <a:t> </a:t>
-            </a:r>
-            <a:r>
-              <a:rPr/>
-              <a:t>particularly</a:t>
-            </a:r>
-            <a:r>
-              <a:rPr/>
-              <a:t> </a:t>
-            </a:r>
-            <a:r>
-              <a:rPr/>
-              <a:t>like</a:t>
-            </a:r>
-            <a:r>
-              <a:rPr/>
-              <a:t> </a:t>
-            </a:r>
-            <a:r>
-              <a:rPr/>
-              <a:t>this</a:t>
-            </a:r>
-            <a:r>
-              <a:rPr/>
-              <a:t> </a:t>
-            </a:r>
-            <a:r>
-              <a:rPr/>
-              <a:t>graph.</a:t>
-            </a:r>
-            <a:r>
-              <a:rPr/>
-              <a:t> </a:t>
-            </a:r>
-            <a:r>
-              <a:rPr/>
-              <a:t>It</a:t>
-            </a:r>
-            <a:r>
-              <a:rPr/>
-              <a:t> </a:t>
-            </a:r>
-            <a:r>
-              <a:rPr/>
-              <a:t>is</a:t>
-            </a:r>
-            <a:r>
-              <a:rPr/>
-              <a:t> </a:t>
-            </a:r>
-            <a:r>
-              <a:rPr/>
-              <a:t>confusing,</a:t>
-            </a:r>
-            <a:r>
-              <a:rPr/>
-              <a:t> </a:t>
-            </a:r>
-            <a:r>
-              <a:rPr/>
-              <a:t>especially</a:t>
+              <a:t>larger</a:t>
+            </a:r>
+            <a:r>
+              <a:rPr/>
+              <a:t> </a:t>
+            </a:r>
+            <a:r>
+              <a:rPr/>
+              <a:t>house,</a:t>
+            </a:r>
+            <a:r>
+              <a:rPr/>
+              <a:t> </a:t>
+            </a:r>
+            <a:r>
+              <a:rPr/>
+              <a:t>the</a:t>
+            </a:r>
+            <a:r>
+              <a:rPr/>
+              <a:t> </a:t>
+            </a:r>
+            <a:r>
+              <a:rPr/>
+              <a:t>house</a:t>
             </a:r>
             <a:r>
               <a:rPr/>
@@ -4178,7 +3772,63 @@
             </a:r>
             <a:r>
               <a:rPr/>
-              <a:t>all</a:t>
+              <a:t>more</a:t>
+            </a:r>
+            <a:r>
+              <a:rPr/>
+              <a:t> </a:t>
+            </a:r>
+            <a:r>
+              <a:rPr/>
+              <a:t>living</a:t>
+            </a:r>
+            <a:r>
+              <a:rPr/>
+              <a:t> </a:t>
+            </a:r>
+            <a:r>
+              <a:rPr/>
+              <a:t>area</a:t>
+            </a:r>
+            <a:r>
+              <a:rPr/>
+              <a:t> </a:t>
+            </a:r>
+            <a:r>
+              <a:rPr/>
+              <a:t>has</a:t>
+            </a:r>
+            <a:r>
+              <a:rPr/>
+              <a:t> </a:t>
+            </a:r>
+            <a:r>
+              <a:rPr/>
+              <a:t>a</a:t>
+            </a:r>
+            <a:r>
+              <a:rPr/>
+              <a:t> </a:t>
+            </a:r>
+            <a:r>
+              <a:rPr/>
+              <a:t>big</a:t>
+            </a:r>
+            <a:r>
+              <a:rPr/>
+              <a:t> </a:t>
+            </a:r>
+            <a:r>
+              <a:rPr/>
+              <a:t>circle</a:t>
+            </a:r>
+            <a:r>
+              <a:rPr/>
+              <a:t> </a:t>
+            </a:r>
+            <a:r>
+              <a:rPr/>
+              <a:t>and</a:t>
             </a:r>
             <a:r>
               <a:rPr/>
@@ -4194,7 +3844,71 @@
             </a:r>
             <a:r>
               <a:rPr/>
-              <a:t>overprinting.</a:t>
+              <a:t>house</a:t>
+            </a:r>
+            <a:r>
+              <a:rPr/>
+              <a:t> </a:t>
+            </a:r>
+            <a:r>
+              <a:rPr/>
+              <a:t>with</a:t>
+            </a:r>
+            <a:r>
+              <a:rPr/>
+              <a:t> </a:t>
+            </a:r>
+            <a:r>
+              <a:rPr/>
+              <a:t>less</a:t>
+            </a:r>
+            <a:r>
+              <a:rPr/>
+              <a:t> </a:t>
+            </a:r>
+            <a:r>
+              <a:rPr/>
+              <a:t>living</a:t>
+            </a:r>
+            <a:r>
+              <a:rPr/>
+              <a:t> </a:t>
+            </a:r>
+            <a:r>
+              <a:rPr/>
+              <a:t>area</a:t>
+            </a:r>
+            <a:r>
+              <a:rPr/>
+              <a:t> </a:t>
+            </a:r>
+            <a:r>
+              <a:rPr/>
+              <a:t>has</a:t>
+            </a:r>
+            <a:r>
+              <a:rPr/>
+              <a:t> </a:t>
+            </a:r>
+            <a:r>
+              <a:rPr/>
+              <a:t>a</a:t>
+            </a:r>
+            <a:r>
+              <a:rPr/>
+              <a:t> </a:t>
+            </a:r>
+            <a:r>
+              <a:rPr/>
+              <a:t>small</a:t>
+            </a:r>
+            <a:r>
+              <a:rPr/>
+              <a:t> </a:t>
+            </a:r>
+            <a:r>
+              <a:rPr/>
+              <a:t>circle.</a:t>
             </a:r>
           </a:p>
         </p:txBody>
@@ -4216,7 +3930,7 @@
           <a:p>
             <a:fld id="{18BDFEC3-8487-43E8-A154-7C12CBC1FFF2}" type="slidenum">
               <a:rPr lang="en-US"/>
-              <a:t>20</a:t>
+              <a:t>16</a:t>
             </a:fld>
             <a:endParaRPr lang="en-US"/>
           </a:p>
@@ -4276,15 +3990,95 @@
             </a:pPr>
             <a:r>
               <a:rPr/>
-              <a:t>Here</a:t>
-            </a:r>
-            <a:r>
-              <a:rPr/>
-              <a:t> </a:t>
-            </a:r>
-            <a:r>
-              <a:rPr/>
-              <a:t>are</a:t>
+              <a:t>This</a:t>
+            </a:r>
+            <a:r>
+              <a:rPr/>
+              <a:t> </a:t>
+            </a:r>
+            <a:r>
+              <a:rPr/>
+              <a:t>plot</a:t>
+            </a:r>
+            <a:r>
+              <a:rPr/>
+              <a:t> </a:t>
+            </a:r>
+            <a:r>
+              <a:rPr/>
+              <a:t>shows</a:t>
+            </a:r>
+            <a:r>
+              <a:rPr/>
+              <a:t> </a:t>
+            </a:r>
+            <a:r>
+              <a:rPr/>
+              <a:t>a</a:t>
+            </a:r>
+            <a:r>
+              <a:rPr/>
+              <a:t> </a:t>
+            </a:r>
+            <a:r>
+              <a:rPr/>
+              <a:t>blue</a:t>
+            </a:r>
+            <a:r>
+              <a:rPr/>
+              <a:t> </a:t>
+            </a:r>
+            <a:r>
+              <a:rPr/>
+              <a:t>point</a:t>
+            </a:r>
+            <a:r>
+              <a:rPr/>
+              <a:t> </a:t>
+            </a:r>
+            <a:r>
+              <a:rPr/>
+              <a:t>representing</a:t>
+            </a:r>
+            <a:r>
+              <a:rPr/>
+              <a:t> </a:t>
+            </a:r>
+            <a:r>
+              <a:rPr/>
+              <a:t>a</a:t>
+            </a:r>
+            <a:r>
+              <a:rPr/>
+              <a:t> </a:t>
+            </a:r>
+            <a:r>
+              <a:rPr/>
+              <a:t>four</a:t>
+            </a:r>
+            <a:r>
+              <a:rPr/>
+              <a:t> </a:t>
+            </a:r>
+            <a:r>
+              <a:rPr/>
+              <a:t>bathroom</a:t>
+            </a:r>
+            <a:r>
+              <a:rPr/>
+              <a:t> </a:t>
+            </a:r>
+            <a:r>
+              <a:rPr/>
+              <a:t>house</a:t>
+            </a:r>
+            <a:r>
+              <a:rPr/>
+              <a:t> </a:t>
+            </a:r>
+            <a:r>
+              <a:rPr/>
+              <a:t>in</a:t>
             </a:r>
             <a:r>
               <a:rPr/>
@@ -4300,7 +4094,95 @@
             </a:r>
             <a:r>
               <a:rPr/>
-              <a:t>steps</a:t>
+              <a:t>upper</a:t>
+            </a:r>
+            <a:r>
+              <a:rPr/>
+              <a:t> </a:t>
+            </a:r>
+            <a:r>
+              <a:rPr/>
+              <a:t>left</a:t>
+            </a:r>
+            <a:r>
+              <a:rPr/>
+              <a:t> </a:t>
+            </a:r>
+            <a:r>
+              <a:rPr/>
+              <a:t>corner</a:t>
+            </a:r>
+            <a:r>
+              <a:rPr/>
+              <a:t> </a:t>
+            </a:r>
+            <a:r>
+              <a:rPr/>
+              <a:t>and</a:t>
+            </a:r>
+            <a:r>
+              <a:rPr/>
+              <a:t> </a:t>
+            </a:r>
+            <a:r>
+              <a:rPr/>
+              <a:t>an</a:t>
+            </a:r>
+            <a:r>
+              <a:rPr/>
+              <a:t> </a:t>
+            </a:r>
+            <a:r>
+              <a:rPr/>
+              <a:t>orange</a:t>
+            </a:r>
+            <a:r>
+              <a:rPr/>
+              <a:t> </a:t>
+            </a:r>
+            <a:r>
+              <a:rPr/>
+              <a:t>point</a:t>
+            </a:r>
+            <a:r>
+              <a:rPr/>
+              <a:t> </a:t>
+            </a:r>
+            <a:r>
+              <a:rPr/>
+              <a:t>representing</a:t>
+            </a:r>
+            <a:r>
+              <a:rPr/>
+              <a:t> </a:t>
+            </a:r>
+            <a:r>
+              <a:rPr/>
+              <a:t>a</a:t>
+            </a:r>
+            <a:r>
+              <a:rPr/>
+              <a:t> </a:t>
+            </a:r>
+            <a:r>
+              <a:rPr/>
+              <a:t>two</a:t>
+            </a:r>
+            <a:r>
+              <a:rPr/>
+              <a:t> </a:t>
+            </a:r>
+            <a:r>
+              <a:rPr/>
+              <a:t>bathroom</a:t>
+            </a:r>
+            <a:r>
+              <a:rPr/>
+              <a:t> </a:t>
+            </a:r>
+            <a:r>
+              <a:rPr/>
+              <a:t>house</a:t>
             </a:r>
             <a:r>
               <a:rPr/>
@@ -4316,38 +4198,6 @@
             </a:r>
             <a:r>
               <a:rPr/>
-              <a:t>Tableau.</a:t>
-            </a:r>
-            <a:r>
-              <a:rPr/>
-              <a:t> </a:t>
-            </a:r>
-            <a:r>
-              <a:rPr/>
-              <a:t>First</a:t>
-            </a:r>
-            <a:r>
-              <a:rPr/>
-              <a:t> </a:t>
-            </a:r>
-            <a:r>
-              <a:rPr/>
-              <a:t>revert</a:t>
-            </a:r>
-            <a:r>
-              <a:rPr/>
-              <a:t> </a:t>
-            </a:r>
-            <a:r>
-              <a:rPr/>
-              <a:t>to</a:t>
-            </a:r>
-            <a:r>
-              <a:rPr/>
-              <a:t> </a:t>
-            </a:r>
-            <a:r>
-              <a:rPr/>
               <a:t>the</a:t>
             </a:r>
             <a:r>
@@ -4356,255 +4206,23 @@
             </a:r>
             <a:r>
               <a:rPr/>
-              <a:t>earlier</a:t>
-            </a:r>
-            <a:r>
-              <a:rPr/>
-              <a:t> </a:t>
-            </a:r>
-            <a:r>
-              <a:rPr/>
-              <a:t>scatterplot</a:t>
-            </a:r>
-            <a:r>
-              <a:rPr/>
-              <a:t> </a:t>
-            </a:r>
-            <a:r>
-              <a:rPr/>
-              <a:t>where</a:t>
-            </a:r>
-            <a:r>
-              <a:rPr/>
-              <a:t> </a:t>
-            </a:r>
-            <a:r>
-              <a:rPr/>
-              <a:t>Age</a:t>
-            </a:r>
-            <a:r>
-              <a:rPr/>
-              <a:t> </a:t>
-            </a:r>
-            <a:r>
-              <a:rPr/>
-              <a:t>is</a:t>
-            </a:r>
-            <a:r>
-              <a:rPr/>
-              <a:t> </a:t>
-            </a:r>
-            <a:r>
-              <a:rPr/>
-              <a:t>in</a:t>
-            </a:r>
-            <a:r>
-              <a:rPr/>
-              <a:t> </a:t>
-            </a:r>
-            <a:r>
-              <a:rPr/>
-              <a:t>the</a:t>
-            </a:r>
-            <a:r>
-              <a:rPr/>
-              <a:t> </a:t>
-            </a:r>
-            <a:r>
-              <a:rPr/>
-              <a:t>Column</a:t>
-            </a:r>
-            <a:r>
-              <a:rPr/>
-              <a:t> </a:t>
-            </a:r>
-            <a:r>
-              <a:rPr/>
-              <a:t>fields</a:t>
-            </a:r>
-            <a:r>
-              <a:rPr/>
-              <a:t> </a:t>
-            </a:r>
-            <a:r>
-              <a:rPr/>
-              <a:t>and</a:t>
-            </a:r>
-            <a:r>
-              <a:rPr/>
-              <a:t> </a:t>
-            </a:r>
-            <a:r>
-              <a:rPr/>
-              <a:t>Price</a:t>
-            </a:r>
-            <a:r>
-              <a:rPr/>
-              <a:t> </a:t>
-            </a:r>
-            <a:r>
-              <a:rPr/>
-              <a:t>is</a:t>
-            </a:r>
-            <a:r>
-              <a:rPr/>
-              <a:t> </a:t>
-            </a:r>
-            <a:r>
-              <a:rPr/>
-              <a:t>in</a:t>
-            </a:r>
-            <a:r>
-              <a:rPr/>
-              <a:t> </a:t>
-            </a:r>
-            <a:r>
-              <a:rPr/>
-              <a:t>the</a:t>
-            </a:r>
-            <a:r>
-              <a:rPr/>
-              <a:t> </a:t>
-            </a:r>
-            <a:r>
-              <a:rPr/>
-              <a:t>Rows</a:t>
-            </a:r>
-            <a:r>
-              <a:rPr/>
-              <a:t> </a:t>
-            </a:r>
-            <a:r>
-              <a:rPr/>
-              <a:t>field.</a:t>
-            </a:r>
-            <a:r>
-              <a:rPr/>
-              <a:t> </a:t>
-            </a:r>
-            <a:r>
-              <a:rPr/>
-              <a:t>Then</a:t>
-            </a:r>
-            <a:r>
-              <a:rPr/>
-              <a:t> </a:t>
-            </a:r>
-            <a:r>
-              <a:rPr/>
-              <a:t>drag</a:t>
-            </a:r>
-            <a:r>
-              <a:rPr/>
-              <a:t> </a:t>
-            </a:r>
-            <a:r>
-              <a:rPr/>
-              <a:t>and</a:t>
-            </a:r>
-            <a:r>
-              <a:rPr/>
-              <a:t> </a:t>
-            </a:r>
-            <a:r>
-              <a:rPr/>
-              <a:t>drop</a:t>
-            </a:r>
-            <a:r>
-              <a:rPr/>
-              <a:t> </a:t>
-            </a:r>
-            <a:r>
-              <a:rPr/>
-              <a:t>Bedrooms</a:t>
-            </a:r>
-            <a:r>
-              <a:rPr/>
-              <a:t> </a:t>
-            </a:r>
-            <a:r>
-              <a:rPr/>
-              <a:t>on</a:t>
-            </a:r>
-            <a:r>
-              <a:rPr/>
-              <a:t> </a:t>
-            </a:r>
-            <a:r>
-              <a:rPr/>
-              <a:t>top</a:t>
-            </a:r>
-            <a:r>
-              <a:rPr/>
-              <a:t> </a:t>
-            </a:r>
-            <a:r>
-              <a:rPr/>
-              <a:t>of</a:t>
-            </a:r>
-            <a:r>
-              <a:rPr/>
-              <a:t> </a:t>
-            </a:r>
-            <a:r>
-              <a:rPr/>
-              <a:t>the</a:t>
-            </a:r>
-            <a:r>
-              <a:rPr/>
-              <a:t> </a:t>
-            </a:r>
-            <a:r>
-              <a:rPr/>
-              <a:t>Shape</a:t>
-            </a:r>
-            <a:r>
-              <a:rPr/>
-              <a:t> </a:t>
-            </a:r>
-            <a:r>
-              <a:rPr/>
-              <a:t>icon.</a:t>
-            </a:r>
-            <a:r>
-              <a:rPr/>
-              <a:t> </a:t>
-            </a:r>
-            <a:r>
-              <a:rPr/>
-              <a:t>Change</a:t>
-            </a:r>
-            <a:r>
-              <a:rPr/>
-              <a:t> </a:t>
-            </a:r>
-            <a:r>
-              <a:rPr/>
-              <a:t>from</a:t>
-            </a:r>
-            <a:r>
-              <a:rPr/>
-              <a:t> </a:t>
-            </a:r>
-            <a:r>
-              <a:rPr/>
-              <a:t>SUM(Bedrooms)</a:t>
-            </a:r>
-            <a:r>
-              <a:rPr/>
-              <a:t> </a:t>
-            </a:r>
-            <a:r>
-              <a:rPr/>
-              <a:t>to</a:t>
-            </a:r>
-            <a:r>
-              <a:rPr/>
-              <a:t> </a:t>
-            </a:r>
-            <a:r>
-              <a:rPr/>
-              <a:t>ATTR(Bedrooms).</a:t>
+              <a:t>lower</a:t>
+            </a:r>
+            <a:r>
+              <a:rPr/>
+              <a:t> </a:t>
+            </a:r>
+            <a:r>
+              <a:rPr/>
+              <a:t>right</a:t>
+            </a:r>
+            <a:r>
+              <a:rPr/>
+              <a:t> </a:t>
+            </a:r>
+            <a:r>
+              <a:rPr/>
+              <a:t>corner.</a:t>
             </a:r>
           </a:p>
         </p:txBody>
@@ -4626,7 +4244,7 @@
           <a:p>
             <a:fld id="{18BDFEC3-8487-43E8-A154-7C12CBC1FFF2}" type="slidenum">
               <a:rPr lang="en-US"/>
-              <a:t>21</a:t>
+              <a:t>18</a:t>
             </a:fld>
             <a:endParaRPr lang="en-US"/>
           </a:p>
@@ -4686,31 +4304,15 @@
             </a:pPr>
             <a:r>
               <a:rPr/>
-              <a:t>You</a:t>
-            </a:r>
-            <a:r>
-              <a:rPr/>
-              <a:t> </a:t>
-            </a:r>
-            <a:r>
-              <a:rPr/>
-              <a:t>can</a:t>
-            </a:r>
-            <a:r>
-              <a:rPr/>
-              <a:t> </a:t>
-            </a:r>
-            <a:r>
-              <a:rPr/>
-              <a:t>also</a:t>
-            </a:r>
-            <a:r>
-              <a:rPr/>
-              <a:t> </a:t>
-            </a:r>
-            <a:r>
-              <a:rPr/>
-              <a:t>use</a:t>
+              <a:t>Notice</a:t>
+            </a:r>
+            <a:r>
+              <a:rPr/>
+              <a:t> </a:t>
+            </a:r>
+            <a:r>
+              <a:rPr/>
+              <a:t>how</a:t>
             </a:r>
             <a:r>
               <a:rPr/>
@@ -4726,183 +4328,7 @@
             </a:r>
             <a:r>
               <a:rPr/>
-              <a:t>size</a:t>
-            </a:r>
-            <a:r>
-              <a:rPr/>
-              <a:t> </a:t>
-            </a:r>
-            <a:r>
-              <a:rPr/>
-              <a:t>of</a:t>
-            </a:r>
-            <a:r>
-              <a:rPr/>
-              <a:t> </a:t>
-            </a:r>
-            <a:r>
-              <a:rPr/>
-              <a:t>a</a:t>
-            </a:r>
-            <a:r>
-              <a:rPr/>
-              <a:t> </a:t>
-            </a:r>
-            <a:r>
-              <a:rPr/>
-              <a:t>point</a:t>
-            </a:r>
-            <a:r>
-              <a:rPr/>
-              <a:t> </a:t>
-            </a:r>
-            <a:r>
-              <a:rPr/>
-              <a:t>to</a:t>
-            </a:r>
-            <a:r>
-              <a:rPr/>
-              <a:t> </a:t>
-            </a:r>
-            <a:r>
-              <a:rPr/>
-              <a:t>represent</a:t>
-            </a:r>
-            <a:r>
-              <a:rPr/>
-              <a:t> </a:t>
-            </a:r>
-            <a:r>
-              <a:rPr/>
-              <a:t>a</a:t>
-            </a:r>
-            <a:r>
-              <a:rPr/>
-              <a:t> </a:t>
-            </a:r>
-            <a:r>
-              <a:rPr/>
-              <a:t>third</a:t>
-            </a:r>
-            <a:r>
-              <a:rPr/>
-              <a:t> </a:t>
-            </a:r>
-            <a:r>
-              <a:rPr/>
-              <a:t>dimension.</a:t>
-            </a:r>
-            <a:r>
-              <a:rPr/>
-              <a:t> </a:t>
-            </a:r>
-            <a:r>
-              <a:rPr/>
-              <a:t>Here</a:t>
-            </a:r>
-            <a:r>
-              <a:rPr/>
-              <a:t> </a:t>
-            </a:r>
-            <a:r>
-              <a:rPr/>
-              <a:t>is</a:t>
-            </a:r>
-            <a:r>
-              <a:rPr/>
-              <a:t> </a:t>
-            </a:r>
-            <a:r>
-              <a:rPr/>
-              <a:t>a</a:t>
-            </a:r>
-            <a:r>
-              <a:rPr/>
-              <a:t> </a:t>
-            </a:r>
-            <a:r>
-              <a:rPr/>
-              <a:t>plot</a:t>
-            </a:r>
-            <a:r>
-              <a:rPr/>
-              <a:t> </a:t>
-            </a:r>
-            <a:r>
-              <a:rPr/>
-              <a:t>where</a:t>
-            </a:r>
-            <a:r>
-              <a:rPr/>
-              <a:t> </a:t>
-            </a:r>
-            <a:r>
-              <a:rPr/>
-              <a:t>the</a:t>
-            </a:r>
-            <a:r>
-              <a:rPr/>
-              <a:t> </a:t>
-            </a:r>
-            <a:r>
-              <a:rPr/>
-              <a:t>larger</a:t>
-            </a:r>
-            <a:r>
-              <a:rPr/>
-              <a:t> </a:t>
-            </a:r>
-            <a:r>
-              <a:rPr/>
-              <a:t>house,</a:t>
-            </a:r>
-            <a:r>
-              <a:rPr/>
-              <a:t> </a:t>
-            </a:r>
-            <a:r>
-              <a:rPr/>
-              <a:t>the</a:t>
-            </a:r>
-            <a:r>
-              <a:rPr/>
-              <a:t> </a:t>
-            </a:r>
-            <a:r>
-              <a:rPr/>
-              <a:t>house</a:t>
-            </a:r>
-            <a:r>
-              <a:rPr/>
-              <a:t> </a:t>
-            </a:r>
-            <a:r>
-              <a:rPr/>
-              <a:t>with</a:t>
-            </a:r>
-            <a:r>
-              <a:rPr/>
-              <a:t> </a:t>
-            </a:r>
-            <a:r>
-              <a:rPr/>
-              <a:t>more</a:t>
-            </a:r>
-            <a:r>
-              <a:rPr/>
-              <a:t> </a:t>
-            </a:r>
-            <a:r>
-              <a:rPr/>
-              <a:t>living</a:t>
-            </a:r>
-            <a:r>
-              <a:rPr/>
-              <a:t> </a:t>
-            </a:r>
-            <a:r>
-              <a:rPr/>
-              <a:t>area</a:t>
+              <a:t>legend</a:t>
             </a:r>
             <a:r>
               <a:rPr/>
@@ -4918,111 +4344,7 @@
             </a:r>
             <a:r>
               <a:rPr/>
-              <a:t>a</a:t>
-            </a:r>
-            <a:r>
-              <a:rPr/>
-              <a:t> </a:t>
-            </a:r>
-            <a:r>
-              <a:rPr/>
-              <a:t>big</a:t>
-            </a:r>
-            <a:r>
-              <a:rPr/>
-              <a:t> </a:t>
-            </a:r>
-            <a:r>
-              <a:rPr/>
-              <a:t>circle</a:t>
-            </a:r>
-            <a:r>
-              <a:rPr/>
-              <a:t> </a:t>
-            </a:r>
-            <a:r>
-              <a:rPr/>
-              <a:t>and</a:t>
-            </a:r>
-            <a:r>
-              <a:rPr/>
-              <a:t> </a:t>
-            </a:r>
-            <a:r>
-              <a:rPr/>
-              <a:t>the</a:t>
-            </a:r>
-            <a:r>
-              <a:rPr/>
-              <a:t> </a:t>
-            </a:r>
-            <a:r>
-              <a:rPr/>
-              <a:t>house</a:t>
-            </a:r>
-            <a:r>
-              <a:rPr/>
-              <a:t> </a:t>
-            </a:r>
-            <a:r>
-              <a:rPr/>
-              <a:t>with</a:t>
-            </a:r>
-            <a:r>
-              <a:rPr/>
-              <a:t> </a:t>
-            </a:r>
-            <a:r>
-              <a:rPr/>
-              <a:t>less</a:t>
-            </a:r>
-            <a:r>
-              <a:rPr/>
-              <a:t> </a:t>
-            </a:r>
-            <a:r>
-              <a:rPr/>
-              <a:t>living</a:t>
-            </a:r>
-            <a:r>
-              <a:rPr/>
-              <a:t> </a:t>
-            </a:r>
-            <a:r>
-              <a:rPr/>
-              <a:t>area</a:t>
-            </a:r>
-            <a:r>
-              <a:rPr/>
-              <a:t> </a:t>
-            </a:r>
-            <a:r>
-              <a:rPr/>
-              <a:t>has</a:t>
-            </a:r>
-            <a:r>
-              <a:rPr/>
-              <a:t> </a:t>
-            </a:r>
-            <a:r>
-              <a:rPr/>
-              <a:t>a</a:t>
-            </a:r>
-            <a:r>
-              <a:rPr/>
-              <a:t> </a:t>
-            </a:r>
-            <a:r>
-              <a:rPr/>
-              <a:t>small</a:t>
-            </a:r>
-            <a:r>
-              <a:rPr/>
-              <a:t> </a:t>
-            </a:r>
-            <a:r>
-              <a:rPr/>
-              <a:t>circle.</a:t>
+              <a:t>changed.</a:t>
             </a:r>
           </a:p>
         </p:txBody>
@@ -5044,7 +4366,7 @@
           <a:p>
             <a:fld id="{18BDFEC3-8487-43E8-A154-7C12CBC1FFF2}" type="slidenum">
               <a:rPr lang="en-US"/>
-              <a:t>22</a:t>
+              <a:t>19</a:t>
             </a:fld>
             <a:endParaRPr lang="en-US"/>
           </a:p>
@@ -8068,7 +7390,7 @@
             </a:pPr>
             <a:r>
               <a:rPr/>
-              <a:t>Data-viz-01,</a:t>
+              <a:t>Scatterplots,</a:t>
             </a:r>
             <a:r>
               <a:rPr/>
@@ -9063,950 +8385,6 @@
             </a:pPr>
             <a:r>
               <a:rPr/>
-              <a:t>Basic</a:t>
-            </a:r>
-            <a:r>
-              <a:rPr/>
-              <a:t> </a:t>
-            </a:r>
-            <a:r>
-              <a:rPr/>
-              <a:t>exercise</a:t>
-            </a:r>
-            <a:r>
-              <a:rPr/>
-              <a:t> </a:t>
-            </a:r>
-            <a:r>
-              <a:rPr/>
-              <a:t>-</a:t>
-            </a:r>
-            <a:r>
-              <a:rPr/>
-              <a:t> </a:t>
-            </a:r>
-            <a:r>
-              <a:rPr/>
-              <a:t>shape</a:t>
-            </a:r>
-          </a:p>
-        </p:txBody>
-      </p:sp>
-      <p:sp>
-        <p:nvSpPr>
-          <p:cNvPr id="3" name="Content Placeholder 2"/>
-          <p:cNvSpPr>
-            <a:spLocks noGrp="1"/>
-          </p:cNvSpPr>
-          <p:nvPr>
-            <p:ph idx="1"/>
-          </p:nvPr>
-        </p:nvSpPr>
-        <p:spPr/>
-        <p:txBody>
-          <a:bodyPr/>
-          <a:lstStyle/>
-          <a:p>
-            <a:pPr lvl="1"/>
-            <a:r>
-              <a:rPr/>
-              <a:t>Use the Saratoga housing data set.</a:t>
-            </a:r>
-          </a:p>
-          <a:p>
-            <a:pPr lvl="1"/>
-            <a:r>
-              <a:rPr/>
-              <a:t>Draw a plot of all of the data where the location is x=Age and y=Price and the symbol represents the number of bedrooms.</a:t>
-            </a:r>
-          </a:p>
-        </p:txBody>
-      </p:sp>
-    </p:spTree>
-  </p:cSld>
-</p:sld>
-</file>
-
-<file path=ppt/slides/slide17.xml><?xml version="1.0" encoding="utf-8"?>
-<p:sld xmlns:a="http://schemas.openxmlformats.org/drawingml/2006/main" xmlns:r="http://schemas.openxmlformats.org/officeDocument/2006/relationships" xmlns:p="http://schemas.openxmlformats.org/presentationml/2006/main">
-  <p:cSld>
-    <p:spTree>
-      <p:nvGrpSpPr>
-        <p:cNvPr id="1" name=""/>
-        <p:cNvGrpSpPr/>
-        <p:nvPr/>
-      </p:nvGrpSpPr>
-      <p:grpSpPr>
-        <a:xfrm>
-          <a:off x="0" y="0"/>
-          <a:ext cx="0" cy="0"/>
-          <a:chOff x="0" y="0"/>
-          <a:chExt cx="0" cy="0"/>
-        </a:xfrm>
-      </p:grpSpPr>
-      <p:sp>
-        <p:nvSpPr>
-          <p:cNvPr id="2" name="Title 1"/>
-          <p:cNvSpPr>
-            <a:spLocks noGrp="1"/>
-          </p:cNvSpPr>
-          <p:nvPr>
-            <p:ph type="title"/>
-          </p:nvPr>
-        </p:nvSpPr>
-        <p:spPr/>
-        <p:txBody>
-          <a:bodyPr/>
-          <a:lstStyle/>
-          <a:p>
-            <a:pPr lvl="0" marL="0" indent="0">
-              <a:buNone/>
-            </a:pPr>
-            <a:r>
-              <a:rPr/>
-              <a:t>Here’s</a:t>
-            </a:r>
-            <a:r>
-              <a:rPr/>
-              <a:t> </a:t>
-            </a:r>
-            <a:r>
-              <a:rPr/>
-              <a:t>the</a:t>
-            </a:r>
-            <a:r>
-              <a:rPr/>
-              <a:t> </a:t>
-            </a:r>
-            <a:r>
-              <a:rPr/>
-              <a:t>Python</a:t>
-            </a:r>
-            <a:r>
-              <a:rPr/>
-              <a:t> </a:t>
-            </a:r>
-            <a:r>
-              <a:rPr/>
-              <a:t>code.</a:t>
-            </a:r>
-          </a:p>
-        </p:txBody>
-      </p:sp>
-      <p:sp>
-        <p:nvSpPr>
-          <p:cNvPr id="3" name="Content Placeholder 2"/>
-          <p:cNvSpPr>
-            <a:spLocks noGrp="1"/>
-          </p:cNvSpPr>
-          <p:nvPr>
-            <p:ph idx="1"/>
-          </p:nvPr>
-        </p:nvSpPr>
-        <p:spPr/>
-        <p:txBody>
-          <a:bodyPr/>
-          <a:lstStyle/>
-          <a:p>
-            <a:pPr lvl="0" marL="1270000" indent="0">
-              <a:buNone/>
-            </a:pPr>
-            <a:r>
-              <a:rPr sz="1800">
-                <a:latin typeface="Courier"/>
-              </a:rPr>
-              <a:t>ch5 = alt.Chart(df).mark_point().encode(
-      x='Age',y='Price', shape='Bedrooms:N')</a:t>
-            </a:r>
-          </a:p>
-        </p:txBody>
-      </p:sp>
-    </p:spTree>
-  </p:cSld>
-</p:sld>
-</file>
-
-<file path=ppt/slides/slide18.xml><?xml version="1.0" encoding="utf-8"?>
-<p:sld xmlns:a="http://schemas.openxmlformats.org/drawingml/2006/main" xmlns:r="http://schemas.openxmlformats.org/officeDocument/2006/relationships" xmlns:p="http://schemas.openxmlformats.org/presentationml/2006/main">
-  <p:cSld>
-    <p:spTree>
-      <p:nvGrpSpPr>
-        <p:cNvPr id="1" name=""/>
-        <p:cNvGrpSpPr/>
-        <p:nvPr/>
-      </p:nvGrpSpPr>
-      <p:grpSpPr>
-        <a:xfrm>
-          <a:off x="0" y="0"/>
-          <a:ext cx="0" cy="0"/>
-          <a:chOff x="0" y="0"/>
-          <a:chExt cx="0" cy="0"/>
-        </a:xfrm>
-      </p:grpSpPr>
-      <p:sp>
-        <p:nvSpPr>
-          <p:cNvPr id="2" name="Title 1"/>
-          <p:cNvSpPr>
-            <a:spLocks noGrp="1"/>
-          </p:cNvSpPr>
-          <p:nvPr>
-            <p:ph type="title"/>
-          </p:nvPr>
-        </p:nvSpPr>
-        <p:spPr/>
-        <p:txBody>
-          <a:bodyPr/>
-          <a:lstStyle/>
-          <a:p>
-            <a:pPr lvl="0" marL="0" indent="0">
-              <a:buNone/>
-            </a:pPr>
-            <a:r>
-              <a:rPr/>
-              <a:t>Here’s</a:t>
-            </a:r>
-            <a:r>
-              <a:rPr/>
-              <a:t> </a:t>
-            </a:r>
-            <a:r>
-              <a:rPr/>
-              <a:t>the</a:t>
-            </a:r>
-            <a:r>
-              <a:rPr/>
-              <a:t> </a:t>
-            </a:r>
-            <a:r>
-              <a:rPr/>
-              <a:t>results</a:t>
-            </a:r>
-            <a:r>
-              <a:rPr/>
-              <a:t> </a:t>
-            </a:r>
-            <a:r>
-              <a:rPr/>
-              <a:t>in</a:t>
-            </a:r>
-            <a:r>
-              <a:rPr/>
-              <a:t> </a:t>
-            </a:r>
-            <a:r>
-              <a:rPr/>
-              <a:t>Python.</a:t>
-            </a:r>
-          </a:p>
-        </p:txBody>
-      </p:sp>
-      <p:pic>
-        <p:nvPicPr>
-          <p:cNvPr descr="../images/python/altair-basic-exercise-shape.png" id="0" name="Picture 1"/>
-          <p:cNvPicPr>
-            <a:picLocks noGrp="1" noChangeAspect="1"/>
-          </p:cNvPicPr>
-          <p:nvPr/>
-        </p:nvPicPr>
-        <p:blipFill>
-          <a:blip r:embed="rId2"/>
-          <a:stretch>
-            <a:fillRect/>
-          </a:stretch>
-        </p:blipFill>
-        <p:spPr bwMode="auto">
-          <a:xfrm>
-            <a:off x="2006600" y="1600200"/>
-            <a:ext cx="5143500" cy="4013200"/>
-          </a:xfrm>
-          <a:prstGeom prst="rect">
-            <a:avLst/>
-          </a:prstGeom>
-          <a:noFill/>
-          <a:ln w="9525">
-            <a:noFill/>
-            <a:headEnd/>
-            <a:tailEnd/>
-          </a:ln>
-        </p:spPr>
-      </p:pic>
-      <p:sp>
-        <p:nvSpPr>
-          <p:cNvPr id="1" name="TextBox 3"/>
-          <p:cNvSpPr txBox="1"/>
-          <p:nvPr/>
-        </p:nvSpPr>
-        <p:spPr>
-          <a:xfrm>
-            <a:off x="457200" y="5613400"/>
-            <a:ext cx="8229600" cy="508000"/>
-          </a:xfrm>
-          <a:prstGeom prst="rect">
-            <a:avLst/>
-          </a:prstGeom>
-          <a:noFill/>
-        </p:spPr>
-        <p:txBody>
-          <a:bodyPr/>
-          <a:lstStyle/>
-          <a:p>
-            <a:pPr lvl="0" marL="0" indent="0" algn="ctr">
-              <a:buNone/>
-            </a:pPr>
-            <a:r>
-              <a:rPr/>
-              <a:t>Python</a:t>
-            </a:r>
-            <a:r>
-              <a:rPr/>
-              <a:t> </a:t>
-            </a:r>
-            <a:r>
-              <a:rPr/>
-              <a:t>scatterplot</a:t>
-            </a:r>
-            <a:r>
-              <a:rPr/>
-              <a:t> </a:t>
-            </a:r>
-            <a:r>
-              <a:rPr/>
-              <a:t>mapping</a:t>
-            </a:r>
-            <a:r>
-              <a:rPr/>
-              <a:t> </a:t>
-            </a:r>
-            <a:r>
-              <a:rPr/>
-              <a:t>bedrooms</a:t>
-            </a:r>
-            <a:r>
-              <a:rPr/>
-              <a:t> </a:t>
-            </a:r>
-            <a:r>
-              <a:rPr/>
-              <a:t>to</a:t>
-            </a:r>
-            <a:r>
-              <a:rPr/>
-              <a:t> </a:t>
-            </a:r>
-            <a:r>
-              <a:rPr/>
-              <a:t>shape</a:t>
-            </a:r>
-          </a:p>
-        </p:txBody>
-      </p:sp>
-    </p:spTree>
-  </p:cSld>
-</p:sld>
-</file>
-
-<file path=ppt/slides/slide19.xml><?xml version="1.0" encoding="utf-8"?>
-<p:sld xmlns:a="http://schemas.openxmlformats.org/drawingml/2006/main" xmlns:r="http://schemas.openxmlformats.org/officeDocument/2006/relationships" xmlns:p="http://schemas.openxmlformats.org/presentationml/2006/main">
-  <p:cSld>
-    <p:spTree>
-      <p:nvGrpSpPr>
-        <p:cNvPr id="1" name=""/>
-        <p:cNvGrpSpPr/>
-        <p:nvPr/>
-      </p:nvGrpSpPr>
-      <p:grpSpPr>
-        <a:xfrm>
-          <a:off x="0" y="0"/>
-          <a:ext cx="0" cy="0"/>
-          <a:chOff x="0" y="0"/>
-          <a:chExt cx="0" cy="0"/>
-        </a:xfrm>
-      </p:grpSpPr>
-      <p:sp>
-        <p:nvSpPr>
-          <p:cNvPr id="3" name="Content Placeholder 2"/>
-          <p:cNvSpPr>
-            <a:spLocks noGrp="1"/>
-          </p:cNvSpPr>
-          <p:nvPr>
-            <p:ph idx="1"/>
-          </p:nvPr>
-        </p:nvSpPr>
-        <p:spPr/>
-        <p:txBody>
-          <a:bodyPr/>
-          <a:lstStyle/>
-          <a:p>
-            <a:pPr lvl="0" marL="0" indent="0">
-              <a:buNone/>
-            </a:pPr>
-            <a:r>
-              <a:rPr/>
-              <a:t>Here’s the R code.</a:t>
-            </a:r>
-          </a:p>
-          <a:p>
-            <a:pPr lvl="0" marL="1270000" indent="0">
-              <a:buNone/>
-            </a:pPr>
-            <a:r>
-              <a:rPr sz="1800">
-                <a:latin typeface="Courier"/>
-              </a:rPr>
-              <a:t>ggplot(saratoga_houses, aes(x=Age, y=Price)) + 
-  geom_point(aes(shape=factor(Bedrooms)))</a:t>
-            </a:r>
-          </a:p>
-        </p:txBody>
-      </p:sp>
-    </p:spTree>
-  </p:cSld>
-</p:sld>
-</file>
-
-<file path=ppt/slides/slide2.xml><?xml version="1.0" encoding="utf-8"?>
-<p:sld xmlns:a="http://schemas.openxmlformats.org/drawingml/2006/main" xmlns:r="http://schemas.openxmlformats.org/officeDocument/2006/relationships" xmlns:p="http://schemas.openxmlformats.org/presentationml/2006/main">
-  <p:cSld>
-    <p:spTree>
-      <p:nvGrpSpPr>
-        <p:cNvPr id="1" name=""/>
-        <p:cNvGrpSpPr/>
-        <p:nvPr/>
-      </p:nvGrpSpPr>
-      <p:grpSpPr>
-        <a:xfrm>
-          <a:off x="0" y="0"/>
-          <a:ext cx="0" cy="0"/>
-          <a:chOff x="0" y="0"/>
-          <a:chExt cx="0" cy="0"/>
-        </a:xfrm>
-      </p:grpSpPr>
-      <p:sp>
-        <p:nvSpPr>
-          <p:cNvPr id="2" name="Title 1"/>
-          <p:cNvSpPr>
-            <a:spLocks noGrp="1"/>
-          </p:cNvSpPr>
-          <p:nvPr>
-            <p:ph type="title"/>
-          </p:nvPr>
-        </p:nvSpPr>
-        <p:spPr/>
-        <p:txBody>
-          <a:bodyPr/>
-          <a:lstStyle/>
-          <a:p>
-            <a:pPr lvl="0" marL="0" indent="0">
-              <a:buNone/>
-            </a:pPr>
-            <a:r>
-              <a:rPr/>
-              <a:t>Review</a:t>
-            </a:r>
-            <a:r>
-              <a:rPr/>
-              <a:t> </a:t>
-            </a:r>
-            <a:r>
-              <a:rPr/>
-              <a:t>basic</a:t>
-            </a:r>
-            <a:r>
-              <a:rPr/>
-              <a:t> </a:t>
-            </a:r>
-            <a:r>
-              <a:rPr/>
-              <a:t>scatterplot</a:t>
-            </a:r>
-          </a:p>
-        </p:txBody>
-      </p:sp>
-      <p:sp>
-        <p:nvSpPr>
-          <p:cNvPr id="3" name="Content Placeholder 2"/>
-          <p:cNvSpPr>
-            <a:spLocks noGrp="1"/>
-          </p:cNvSpPr>
-          <p:nvPr>
-            <p:ph idx="1"/>
-          </p:nvPr>
-        </p:nvSpPr>
-        <p:spPr/>
-        <p:txBody>
-          <a:bodyPr/>
-          <a:lstStyle/>
-          <a:p>
-            <a:pPr lvl="1"/>
-            <a:r>
-              <a:rPr/>
-              <a:t>Python code</a:t>
-            </a:r>
-          </a:p>
-          <a:p>
-            <a:pPr lvl="0" marL="1270000" indent="0">
-              <a:buNone/>
-            </a:pPr>
-            <a:r>
-              <a:rPr sz="1800">
-                <a:latin typeface="Courier"/>
-              </a:rPr>
-              <a:t>ch = alt.Chart(df).mark_point().encode(
-    x='Age', y='Price'
-)</a:t>
-            </a:r>
-          </a:p>
-          <a:p>
-            <a:pPr lvl="1"/>
-            <a:r>
-              <a:rPr/>
-              <a:t>R code</a:t>
-            </a:r>
-          </a:p>
-          <a:p>
-            <a:pPr lvl="0" marL="1270000" indent="0">
-              <a:buNone/>
-            </a:pPr>
-            <a:r>
-              <a:rPr sz="1800">
-                <a:latin typeface="Courier"/>
-              </a:rPr>
-              <a:t>ggplot(saratoga_houses, aes(x=Age, y=Price)) +
-  geom_point()</a:t>
-            </a:r>
-          </a:p>
-          <a:p>
-            <a:pPr lvl="1"/>
-            <a:r>
-              <a:rPr/>
-              <a:t>Tableau</a:t>
-            </a:r>
-          </a:p>
-          <a:p>
-            <a:pPr lvl="2"/>
-            <a:r>
-              <a:rPr/>
-              <a:t>(Drag and drop)</a:t>
-            </a:r>
-          </a:p>
-        </p:txBody>
-      </p:sp>
-    </p:spTree>
-  </p:cSld>
-</p:sld>
-</file>
-
-<file path=ppt/slides/slide20.xml><?xml version="1.0" encoding="utf-8"?>
-<p:sld xmlns:a="http://schemas.openxmlformats.org/drawingml/2006/main" xmlns:r="http://schemas.openxmlformats.org/officeDocument/2006/relationships" xmlns:p="http://schemas.openxmlformats.org/presentationml/2006/main">
-  <p:cSld>
-    <p:spTree>
-      <p:nvGrpSpPr>
-        <p:cNvPr id="1" name=""/>
-        <p:cNvGrpSpPr/>
-        <p:nvPr/>
-      </p:nvGrpSpPr>
-      <p:grpSpPr>
-        <a:xfrm>
-          <a:off x="0" y="0"/>
-          <a:ext cx="0" cy="0"/>
-          <a:chOff x="0" y="0"/>
-          <a:chExt cx="0" cy="0"/>
-        </a:xfrm>
-      </p:grpSpPr>
-      <p:sp>
-        <p:nvSpPr>
-          <p:cNvPr id="2" name="Title 1"/>
-          <p:cNvSpPr>
-            <a:spLocks noGrp="1"/>
-          </p:cNvSpPr>
-          <p:nvPr>
-            <p:ph type="title"/>
-          </p:nvPr>
-        </p:nvSpPr>
-        <p:spPr/>
-        <p:txBody>
-          <a:bodyPr/>
-          <a:lstStyle/>
-          <a:p>
-            <a:pPr lvl="0" marL="0" indent="0">
-              <a:buNone/>
-            </a:pPr>
-            <a:r>
-              <a:rPr/>
-              <a:t>Here’s</a:t>
-            </a:r>
-            <a:r>
-              <a:rPr/>
-              <a:t> </a:t>
-            </a:r>
-            <a:r>
-              <a:rPr/>
-              <a:t>the</a:t>
-            </a:r>
-            <a:r>
-              <a:rPr/>
-              <a:t> </a:t>
-            </a:r>
-            <a:r>
-              <a:rPr/>
-              <a:t>results</a:t>
-            </a:r>
-            <a:r>
-              <a:rPr/>
-              <a:t> </a:t>
-            </a:r>
-            <a:r>
-              <a:rPr/>
-              <a:t>in</a:t>
-            </a:r>
-            <a:r>
-              <a:rPr/>
-              <a:t> </a:t>
-            </a:r>
-            <a:r>
-              <a:rPr/>
-              <a:t>R</a:t>
-            </a:r>
-          </a:p>
-        </p:txBody>
-      </p:sp>
-      <p:pic>
-        <p:nvPicPr>
-          <p:cNvPr descr="../images/r/shape-bedrooms.png" id="0" name="Picture 1"/>
-          <p:cNvPicPr>
-            <a:picLocks noGrp="1" noChangeAspect="1"/>
-          </p:cNvPicPr>
-          <p:nvPr/>
-        </p:nvPicPr>
-        <p:blipFill>
-          <a:blip r:embed="rId3"/>
-          <a:stretch>
-            <a:fillRect/>
-          </a:stretch>
-        </p:blipFill>
-        <p:spPr bwMode="auto">
-          <a:xfrm>
-            <a:off x="2565400" y="1600200"/>
-            <a:ext cx="4013200" cy="4013200"/>
-          </a:xfrm>
-          <a:prstGeom prst="rect">
-            <a:avLst/>
-          </a:prstGeom>
-          <a:noFill/>
-          <a:ln w="9525">
-            <a:noFill/>
-            <a:headEnd/>
-            <a:tailEnd/>
-          </a:ln>
-        </p:spPr>
-      </p:pic>
-      <p:sp>
-        <p:nvSpPr>
-          <p:cNvPr id="1" name="TextBox 3"/>
-          <p:cNvSpPr txBox="1"/>
-          <p:nvPr/>
-        </p:nvSpPr>
-        <p:spPr>
-          <a:xfrm>
-            <a:off x="457200" y="5613400"/>
-            <a:ext cx="8229600" cy="508000"/>
-          </a:xfrm>
-          <a:prstGeom prst="rect">
-            <a:avLst/>
-          </a:prstGeom>
-          <a:noFill/>
-        </p:spPr>
-        <p:txBody>
-          <a:bodyPr/>
-          <a:lstStyle/>
-          <a:p>
-            <a:pPr lvl="0" marL="0" indent="0" algn="ctr">
-              <a:buNone/>
-            </a:pPr>
-            <a:r>
-              <a:rPr/>
-              <a:t>R</a:t>
-            </a:r>
-            <a:r>
-              <a:rPr/>
-              <a:t> </a:t>
-            </a:r>
-            <a:r>
-              <a:rPr/>
-              <a:t>scatterplot</a:t>
-            </a:r>
-            <a:r>
-              <a:rPr/>
-              <a:t> </a:t>
-            </a:r>
-            <a:r>
-              <a:rPr/>
-              <a:t>mapping</a:t>
-            </a:r>
-            <a:r>
-              <a:rPr/>
-              <a:t> </a:t>
-            </a:r>
-            <a:r>
-              <a:rPr/>
-              <a:t>bedrooms</a:t>
-            </a:r>
-            <a:r>
-              <a:rPr/>
-              <a:t> </a:t>
-            </a:r>
-            <a:r>
-              <a:rPr/>
-              <a:t>to</a:t>
-            </a:r>
-            <a:r>
-              <a:rPr/>
-              <a:t> </a:t>
-            </a:r>
-            <a:r>
-              <a:rPr/>
-              <a:t>shape</a:t>
-            </a:r>
-          </a:p>
-        </p:txBody>
-      </p:sp>
-    </p:spTree>
-  </p:cSld>
-</p:sld>
-</file>
-
-<file path=ppt/slides/slide21.xml><?xml version="1.0" encoding="utf-8"?>
-<p:sld xmlns:a="http://schemas.openxmlformats.org/drawingml/2006/main" xmlns:r="http://schemas.openxmlformats.org/officeDocument/2006/relationships" xmlns:p="http://schemas.openxmlformats.org/presentationml/2006/main">
-  <p:cSld>
-    <p:spTree>
-      <p:nvGrpSpPr>
-        <p:cNvPr id="1" name=""/>
-        <p:cNvGrpSpPr/>
-        <p:nvPr/>
-      </p:nvGrpSpPr>
-      <p:grpSpPr>
-        <a:xfrm>
-          <a:off x="0" y="0"/>
-          <a:ext cx="0" cy="0"/>
-          <a:chOff x="0" y="0"/>
-          <a:chExt cx="0" cy="0"/>
-        </a:xfrm>
-      </p:grpSpPr>
-      <p:sp>
-        <p:nvSpPr>
-          <p:cNvPr id="2" name="Title 1"/>
-          <p:cNvSpPr>
-            <a:spLocks noGrp="1"/>
-          </p:cNvSpPr>
-          <p:nvPr>
-            <p:ph type="title"/>
-          </p:nvPr>
-        </p:nvSpPr>
-        <p:spPr/>
-        <p:txBody>
-          <a:bodyPr/>
-          <a:lstStyle/>
-          <a:p>
-            <a:pPr lvl="0" marL="0" indent="0">
-              <a:buNone/>
-            </a:pPr>
-            <a:r>
-              <a:rPr/>
-              <a:t>Here</a:t>
-            </a:r>
-            <a:r>
-              <a:rPr/>
-              <a:t> </a:t>
-            </a:r>
-            <a:r>
-              <a:rPr/>
-              <a:t>’s</a:t>
-            </a:r>
-            <a:r>
-              <a:rPr/>
-              <a:t> </a:t>
-            </a:r>
-            <a:r>
-              <a:rPr/>
-              <a:t>the</a:t>
-            </a:r>
-            <a:r>
-              <a:rPr/>
-              <a:t> </a:t>
-            </a:r>
-            <a:r>
-              <a:rPr/>
-              <a:t>result</a:t>
-            </a:r>
-            <a:r>
-              <a:rPr/>
-              <a:t> </a:t>
-            </a:r>
-            <a:r>
-              <a:rPr/>
-              <a:t>in</a:t>
-            </a:r>
-            <a:r>
-              <a:rPr/>
-              <a:t> </a:t>
-            </a:r>
-            <a:r>
-              <a:rPr/>
-              <a:t>Tableau.</a:t>
-            </a:r>
-          </a:p>
-        </p:txBody>
-      </p:sp>
-      <p:pic>
-        <p:nvPicPr>
-          <p:cNvPr descr="../images/tableau/shape-bedrooms.png" id="0" name="Picture 1"/>
-          <p:cNvPicPr>
-            <a:picLocks noGrp="1" noChangeAspect="1"/>
-          </p:cNvPicPr>
-          <p:nvPr/>
-        </p:nvPicPr>
-        <p:blipFill>
-          <a:blip r:embed="rId3"/>
-          <a:stretch>
-            <a:fillRect/>
-          </a:stretch>
-        </p:blipFill>
-        <p:spPr bwMode="auto">
-          <a:xfrm>
-            <a:off x="558800" y="1600200"/>
-            <a:ext cx="8026400" cy="4013200"/>
-          </a:xfrm>
-          <a:prstGeom prst="rect">
-            <a:avLst/>
-          </a:prstGeom>
-          <a:noFill/>
-          <a:ln w="9525">
-            <a:noFill/>
-            <a:headEnd/>
-            <a:tailEnd/>
-          </a:ln>
-        </p:spPr>
-      </p:pic>
-      <p:sp>
-        <p:nvSpPr>
-          <p:cNvPr id="1" name="TextBox 3"/>
-          <p:cNvSpPr txBox="1"/>
-          <p:nvPr/>
-        </p:nvSpPr>
-        <p:spPr>
-          <a:xfrm>
-            <a:off x="457200" y="5613400"/>
-            <a:ext cx="8229600" cy="508000"/>
-          </a:xfrm>
-          <a:prstGeom prst="rect">
-            <a:avLst/>
-          </a:prstGeom>
-          <a:noFill/>
-        </p:spPr>
-        <p:txBody>
-          <a:bodyPr/>
-          <a:lstStyle/>
-          <a:p>
-            <a:pPr lvl="0" marL="0" indent="0" algn="ctr">
-              <a:buNone/>
-            </a:pPr>
-            <a:r>
-              <a:rPr/>
-              <a:t>Tableau</a:t>
-            </a:r>
-            <a:r>
-              <a:rPr/>
-              <a:t> </a:t>
-            </a:r>
-            <a:r>
-              <a:rPr/>
-              <a:t>scatterplot</a:t>
-            </a:r>
-            <a:r>
-              <a:rPr/>
-              <a:t> </a:t>
-            </a:r>
-            <a:r>
-              <a:rPr/>
-              <a:t>using</a:t>
-            </a:r>
-            <a:r>
-              <a:rPr/>
-              <a:t> </a:t>
-            </a:r>
-            <a:r>
-              <a:rPr/>
-              <a:t>shapes</a:t>
-            </a:r>
-            <a:r>
-              <a:rPr/>
-              <a:t> </a:t>
-            </a:r>
-            <a:r>
-              <a:rPr/>
-              <a:t>to</a:t>
-            </a:r>
-            <a:r>
-              <a:rPr/>
-              <a:t> </a:t>
-            </a:r>
-            <a:r>
-              <a:rPr/>
-              <a:t>represent</a:t>
-            </a:r>
-            <a:r>
-              <a:rPr/>
-              <a:t> </a:t>
-            </a:r>
-            <a:r>
-              <a:rPr/>
-              <a:t>Bedrooms</a:t>
-            </a:r>
-          </a:p>
-        </p:txBody>
-      </p:sp>
-    </p:spTree>
-  </p:cSld>
-</p:sld>
-</file>
-
-<file path=ppt/slides/slide22.xml><?xml version="1.0" encoding="utf-8"?>
-<p:sld xmlns:a="http://schemas.openxmlformats.org/drawingml/2006/main" xmlns:r="http://schemas.openxmlformats.org/officeDocument/2006/relationships" xmlns:p="http://schemas.openxmlformats.org/presentationml/2006/main">
-  <p:cSld>
-    <p:spTree>
-      <p:nvGrpSpPr>
-        <p:cNvPr id="1" name=""/>
-        <p:cNvGrpSpPr/>
-        <p:nvPr/>
-      </p:nvGrpSpPr>
-      <p:grpSpPr>
-        <a:xfrm>
-          <a:off x="0" y="0"/>
-          <a:ext cx="0" cy="0"/>
-          <a:chOff x="0" y="0"/>
-          <a:chExt cx="0" cy="0"/>
-        </a:xfrm>
-      </p:grpSpPr>
-      <p:sp>
-        <p:nvSpPr>
-          <p:cNvPr id="2" name="Title 1"/>
-          <p:cNvSpPr>
-            <a:spLocks noGrp="1"/>
-          </p:cNvSpPr>
-          <p:nvPr>
-            <p:ph type="title"/>
-          </p:nvPr>
-        </p:nvSpPr>
-        <p:spPr/>
-        <p:txBody>
-          <a:bodyPr/>
-          <a:lstStyle/>
-          <a:p>
-            <a:pPr lvl="0" marL="0" indent="0">
-              <a:buNone/>
-            </a:pPr>
-            <a:r>
-              <a:rPr/>
               <a:t>Aesthetics</a:t>
             </a:r>
             <a:r>
@@ -10133,7 +8511,7 @@
 </p:sld>
 </file>
 
-<file path=ppt/slides/slide23.xml><?xml version="1.0" encoding="utf-8"?>
+<file path=ppt/slides/slide17.xml><?xml version="1.0" encoding="utf-8"?>
 <p:sld xmlns:a="http://schemas.openxmlformats.org/drawingml/2006/main" xmlns:r="http://schemas.openxmlformats.org/officeDocument/2006/relationships" xmlns:p="http://schemas.openxmlformats.org/presentationml/2006/main">
   <p:cSld>
     <p:spTree>
@@ -10234,910 +8612,7 @@
 </p:sld>
 </file>
 
-<file path=ppt/slides/slide24.xml><?xml version="1.0" encoding="utf-8"?>
-<p:sld xmlns:a="http://schemas.openxmlformats.org/drawingml/2006/main" xmlns:r="http://schemas.openxmlformats.org/officeDocument/2006/relationships" xmlns:p="http://schemas.openxmlformats.org/presentationml/2006/main">
-  <p:cSld>
-    <p:spTree>
-      <p:nvGrpSpPr>
-        <p:cNvPr id="1" name=""/>
-        <p:cNvGrpSpPr/>
-        <p:nvPr/>
-      </p:nvGrpSpPr>
-      <p:grpSpPr>
-        <a:xfrm>
-          <a:off x="0" y="0"/>
-          <a:ext cx="0" cy="0"/>
-          <a:chOff x="0" y="0"/>
-          <a:chExt cx="0" cy="0"/>
-        </a:xfrm>
-      </p:grpSpPr>
-      <p:sp>
-        <p:nvSpPr>
-          <p:cNvPr id="2" name="Title 1"/>
-          <p:cNvSpPr>
-            <a:spLocks noGrp="1"/>
-          </p:cNvSpPr>
-          <p:nvPr>
-            <p:ph type="title"/>
-          </p:nvPr>
-        </p:nvSpPr>
-        <p:spPr/>
-        <p:txBody>
-          <a:bodyPr/>
-          <a:lstStyle/>
-          <a:p>
-            <a:pPr lvl="0" marL="0" indent="0">
-              <a:buNone/>
-            </a:pPr>
-            <a:r>
-              <a:rPr/>
-              <a:t>Basic</a:t>
-            </a:r>
-            <a:r>
-              <a:rPr/>
-              <a:t> </a:t>
-            </a:r>
-            <a:r>
-              <a:rPr/>
-              <a:t>exercise</a:t>
-            </a:r>
-            <a:r>
-              <a:rPr/>
-              <a:t> </a:t>
-            </a:r>
-            <a:r>
-              <a:rPr/>
-              <a:t>-</a:t>
-            </a:r>
-            <a:r>
-              <a:rPr/>
-              <a:t> </a:t>
-            </a:r>
-            <a:r>
-              <a:rPr/>
-              <a:t>size</a:t>
-            </a:r>
-          </a:p>
-        </p:txBody>
-      </p:sp>
-      <p:sp>
-        <p:nvSpPr>
-          <p:cNvPr id="3" name="Content Placeholder 2"/>
-          <p:cNvSpPr>
-            <a:spLocks noGrp="1"/>
-          </p:cNvSpPr>
-          <p:nvPr>
-            <p:ph idx="1"/>
-          </p:nvPr>
-        </p:nvSpPr>
-        <p:spPr/>
-        <p:txBody>
-          <a:bodyPr/>
-          <a:lstStyle/>
-          <a:p>
-            <a:pPr lvl="1"/>
-            <a:r>
-              <a:rPr/>
-              <a:t>Use the Saratoga housing data set.</a:t>
-            </a:r>
-          </a:p>
-          <a:p>
-            <a:pPr lvl="1"/>
-            <a:r>
-              <a:rPr/>
-              <a:t>Draw a plot where the location is x=Age and y=Price and the size represents the living area.</a:t>
-            </a:r>
-          </a:p>
-        </p:txBody>
-      </p:sp>
-    </p:spTree>
-  </p:cSld>
-</p:sld>
-</file>
-
-<file path=ppt/slides/slide25.xml><?xml version="1.0" encoding="utf-8"?>
-<p:sld xmlns:a="http://schemas.openxmlformats.org/drawingml/2006/main" xmlns:r="http://schemas.openxmlformats.org/officeDocument/2006/relationships" xmlns:p="http://schemas.openxmlformats.org/presentationml/2006/main">
-  <p:cSld>
-    <p:spTree>
-      <p:nvGrpSpPr>
-        <p:cNvPr id="1" name=""/>
-        <p:cNvGrpSpPr/>
-        <p:nvPr/>
-      </p:nvGrpSpPr>
-      <p:grpSpPr>
-        <a:xfrm>
-          <a:off x="0" y="0"/>
-          <a:ext cx="0" cy="0"/>
-          <a:chOff x="0" y="0"/>
-          <a:chExt cx="0" cy="0"/>
-        </a:xfrm>
-      </p:grpSpPr>
-      <p:sp>
-        <p:nvSpPr>
-          <p:cNvPr id="2" name="Title 1"/>
-          <p:cNvSpPr>
-            <a:spLocks noGrp="1"/>
-          </p:cNvSpPr>
-          <p:nvPr>
-            <p:ph type="title"/>
-          </p:nvPr>
-        </p:nvSpPr>
-        <p:spPr/>
-        <p:txBody>
-          <a:bodyPr/>
-          <a:lstStyle/>
-          <a:p>
-            <a:pPr lvl="0" marL="0" indent="0">
-              <a:buNone/>
-            </a:pPr>
-            <a:r>
-              <a:rPr/>
-              <a:t>Here’s</a:t>
-            </a:r>
-            <a:r>
-              <a:rPr/>
-              <a:t> </a:t>
-            </a:r>
-            <a:r>
-              <a:rPr/>
-              <a:t>the</a:t>
-            </a:r>
-            <a:r>
-              <a:rPr/>
-              <a:t> </a:t>
-            </a:r>
-            <a:r>
-              <a:rPr/>
-              <a:t>Python</a:t>
-            </a:r>
-            <a:r>
-              <a:rPr/>
-              <a:t> </a:t>
-            </a:r>
-            <a:r>
-              <a:rPr/>
-              <a:t>code.</a:t>
-            </a:r>
-          </a:p>
-        </p:txBody>
-      </p:sp>
-      <p:sp>
-        <p:nvSpPr>
-          <p:cNvPr id="3" name="Content Placeholder 2"/>
-          <p:cNvSpPr>
-            <a:spLocks noGrp="1"/>
-          </p:cNvSpPr>
-          <p:nvPr>
-            <p:ph idx="1"/>
-          </p:nvPr>
-        </p:nvSpPr>
-        <p:spPr/>
-        <p:txBody>
-          <a:bodyPr/>
-          <a:lstStyle/>
-          <a:p>
-            <a:pPr lvl="0" marL="1270000" indent="0">
-              <a:buNone/>
-            </a:pPr>
-            <a:r>
-              <a:rPr sz="1800">
-                <a:latin typeface="Courier"/>
-              </a:rPr>
-              <a:t>ch6 = alt.Chart(df).mark_point().encode(
-      x='Age',y='Price', size='Size')</a:t>
-            </a:r>
-          </a:p>
-        </p:txBody>
-      </p:sp>
-    </p:spTree>
-  </p:cSld>
-</p:sld>
-</file>
-
-<file path=ppt/slides/slide26.xml><?xml version="1.0" encoding="utf-8"?>
-<p:sld xmlns:a="http://schemas.openxmlformats.org/drawingml/2006/main" xmlns:r="http://schemas.openxmlformats.org/officeDocument/2006/relationships" xmlns:p="http://schemas.openxmlformats.org/presentationml/2006/main">
-  <p:cSld>
-    <p:spTree>
-      <p:nvGrpSpPr>
-        <p:cNvPr id="1" name=""/>
-        <p:cNvGrpSpPr/>
-        <p:nvPr/>
-      </p:nvGrpSpPr>
-      <p:grpSpPr>
-        <a:xfrm>
-          <a:off x="0" y="0"/>
-          <a:ext cx="0" cy="0"/>
-          <a:chOff x="0" y="0"/>
-          <a:chExt cx="0" cy="0"/>
-        </a:xfrm>
-      </p:grpSpPr>
-      <p:sp>
-        <p:nvSpPr>
-          <p:cNvPr id="2" name="Title 1"/>
-          <p:cNvSpPr>
-            <a:spLocks noGrp="1"/>
-          </p:cNvSpPr>
-          <p:nvPr>
-            <p:ph type="title"/>
-          </p:nvPr>
-        </p:nvSpPr>
-        <p:spPr/>
-        <p:txBody>
-          <a:bodyPr/>
-          <a:lstStyle/>
-          <a:p>
-            <a:pPr lvl="0" marL="0" indent="0">
-              <a:buNone/>
-            </a:pPr>
-            <a:r>
-              <a:rPr/>
-              <a:t>Here’s</a:t>
-            </a:r>
-            <a:r>
-              <a:rPr/>
-              <a:t> </a:t>
-            </a:r>
-            <a:r>
-              <a:rPr/>
-              <a:t>the</a:t>
-            </a:r>
-            <a:r>
-              <a:rPr/>
-              <a:t> </a:t>
-            </a:r>
-            <a:r>
-              <a:rPr/>
-              <a:t>result</a:t>
-            </a:r>
-            <a:r>
-              <a:rPr/>
-              <a:t> </a:t>
-            </a:r>
-            <a:r>
-              <a:rPr/>
-              <a:t>in</a:t>
-            </a:r>
-            <a:r>
-              <a:rPr/>
-              <a:t> </a:t>
-            </a:r>
-            <a:r>
-              <a:rPr/>
-              <a:t>Python.</a:t>
-            </a:r>
-          </a:p>
-        </p:txBody>
-      </p:sp>
-      <p:pic>
-        <p:nvPicPr>
-          <p:cNvPr descr="../images/python/altair-basic-exercise-size.png" id="0" name="Picture 1"/>
-          <p:cNvPicPr>
-            <a:picLocks noGrp="1" noChangeAspect="1"/>
-          </p:cNvPicPr>
-          <p:nvPr/>
-        </p:nvPicPr>
-        <p:blipFill>
-          <a:blip r:embed="rId2"/>
-          <a:stretch>
-            <a:fillRect/>
-          </a:stretch>
-        </p:blipFill>
-        <p:spPr bwMode="auto">
-          <a:xfrm>
-            <a:off x="2006600" y="1600200"/>
-            <a:ext cx="5143500" cy="4013200"/>
-          </a:xfrm>
-          <a:prstGeom prst="rect">
-            <a:avLst/>
-          </a:prstGeom>
-          <a:noFill/>
-          <a:ln w="9525">
-            <a:noFill/>
-            <a:headEnd/>
-            <a:tailEnd/>
-          </a:ln>
-        </p:spPr>
-      </p:pic>
-      <p:sp>
-        <p:nvSpPr>
-          <p:cNvPr id="1" name="TextBox 3"/>
-          <p:cNvSpPr txBox="1"/>
-          <p:nvPr/>
-        </p:nvSpPr>
-        <p:spPr>
-          <a:xfrm>
-            <a:off x="457200" y="5613400"/>
-            <a:ext cx="8229600" cy="508000"/>
-          </a:xfrm>
-          <a:prstGeom prst="rect">
-            <a:avLst/>
-          </a:prstGeom>
-          <a:noFill/>
-        </p:spPr>
-        <p:txBody>
-          <a:bodyPr/>
-          <a:lstStyle/>
-          <a:p>
-            <a:pPr lvl="0" marL="0" indent="0" algn="ctr">
-              <a:buNone/>
-            </a:pPr>
-            <a:r>
-              <a:rPr/>
-              <a:t>Python</a:t>
-            </a:r>
-            <a:r>
-              <a:rPr/>
-              <a:t> </a:t>
-            </a:r>
-            <a:r>
-              <a:rPr/>
-              <a:t>scatterplot</a:t>
-            </a:r>
-            <a:r>
-              <a:rPr/>
-              <a:t> </a:t>
-            </a:r>
-            <a:r>
-              <a:rPr/>
-              <a:t>mapping</a:t>
-            </a:r>
-            <a:r>
-              <a:rPr/>
-              <a:t> </a:t>
-            </a:r>
-            <a:r>
-              <a:rPr/>
-              <a:t>living</a:t>
-            </a:r>
-            <a:r>
-              <a:rPr/>
-              <a:t> </a:t>
-            </a:r>
-            <a:r>
-              <a:rPr/>
-              <a:t>area</a:t>
-            </a:r>
-            <a:r>
-              <a:rPr/>
-              <a:t> </a:t>
-            </a:r>
-            <a:r>
-              <a:rPr/>
-              <a:t>to</a:t>
-            </a:r>
-            <a:r>
-              <a:rPr/>
-              <a:t> </a:t>
-            </a:r>
-            <a:r>
-              <a:rPr/>
-              <a:t>size</a:t>
-            </a:r>
-          </a:p>
-        </p:txBody>
-      </p:sp>
-    </p:spTree>
-  </p:cSld>
-</p:sld>
-</file>
-
-<file path=ppt/slides/slide27.xml><?xml version="1.0" encoding="utf-8"?>
-<p:sld xmlns:a="http://schemas.openxmlformats.org/drawingml/2006/main" xmlns:r="http://schemas.openxmlformats.org/officeDocument/2006/relationships" xmlns:p="http://schemas.openxmlformats.org/presentationml/2006/main">
-  <p:cSld>
-    <p:spTree>
-      <p:nvGrpSpPr>
-        <p:cNvPr id="1" name=""/>
-        <p:cNvGrpSpPr/>
-        <p:nvPr/>
-      </p:nvGrpSpPr>
-      <p:grpSpPr>
-        <a:xfrm>
-          <a:off x="0" y="0"/>
-          <a:ext cx="0" cy="0"/>
-          <a:chOff x="0" y="0"/>
-          <a:chExt cx="0" cy="0"/>
-        </a:xfrm>
-      </p:grpSpPr>
-      <p:sp>
-        <p:nvSpPr>
-          <p:cNvPr id="2" name="Title 1"/>
-          <p:cNvSpPr>
-            <a:spLocks noGrp="1"/>
-          </p:cNvSpPr>
-          <p:nvPr>
-            <p:ph type="title"/>
-          </p:nvPr>
-        </p:nvSpPr>
-        <p:spPr/>
-        <p:txBody>
-          <a:bodyPr/>
-          <a:lstStyle/>
-          <a:p>
-            <a:pPr lvl="0" marL="0" indent="0">
-              <a:buNone/>
-            </a:pPr>
-            <a:r>
-              <a:rPr/>
-              <a:t>Here’s</a:t>
-            </a:r>
-            <a:r>
-              <a:rPr/>
-              <a:t> </a:t>
-            </a:r>
-            <a:r>
-              <a:rPr/>
-              <a:t>the</a:t>
-            </a:r>
-            <a:r>
-              <a:rPr/>
-              <a:t> </a:t>
-            </a:r>
-            <a:r>
-              <a:rPr/>
-              <a:t>R</a:t>
-            </a:r>
-            <a:r>
-              <a:rPr/>
-              <a:t> </a:t>
-            </a:r>
-            <a:r>
-              <a:rPr/>
-              <a:t>code.</a:t>
-            </a:r>
-          </a:p>
-        </p:txBody>
-      </p:sp>
-      <p:sp>
-        <p:nvSpPr>
-          <p:cNvPr id="3" name="Content Placeholder 2"/>
-          <p:cNvSpPr>
-            <a:spLocks noGrp="1"/>
-          </p:cNvSpPr>
-          <p:nvPr>
-            <p:ph idx="1"/>
-          </p:nvPr>
-        </p:nvSpPr>
-        <p:spPr/>
-        <p:txBody>
-          <a:bodyPr/>
-          <a:lstStyle/>
-          <a:p>
-            <a:pPr lvl="0" marL="1270000" indent="0">
-              <a:buNone/>
-            </a:pPr>
-            <a:r>
-              <a:rPr sz="1800">
-                <a:latin typeface="Courier"/>
-              </a:rPr>
-              <a:t>ggplot(saratoga_houses, aes(x=Age, y=Price)) + 
-  geom_point(aes(size=Living.Area))</a:t>
-            </a:r>
-          </a:p>
-        </p:txBody>
-      </p:sp>
-    </p:spTree>
-  </p:cSld>
-</p:sld>
-</file>
-
-<file path=ppt/slides/slide28.xml><?xml version="1.0" encoding="utf-8"?>
-<p:sld xmlns:a="http://schemas.openxmlformats.org/drawingml/2006/main" xmlns:r="http://schemas.openxmlformats.org/officeDocument/2006/relationships" xmlns:p="http://schemas.openxmlformats.org/presentationml/2006/main">
-  <p:cSld>
-    <p:spTree>
-      <p:nvGrpSpPr>
-        <p:cNvPr id="1" name=""/>
-        <p:cNvGrpSpPr/>
-        <p:nvPr/>
-      </p:nvGrpSpPr>
-      <p:grpSpPr>
-        <a:xfrm>
-          <a:off x="0" y="0"/>
-          <a:ext cx="0" cy="0"/>
-          <a:chOff x="0" y="0"/>
-          <a:chExt cx="0" cy="0"/>
-        </a:xfrm>
-      </p:grpSpPr>
-      <p:sp>
-        <p:nvSpPr>
-          <p:cNvPr id="2" name="Title 1"/>
-          <p:cNvSpPr>
-            <a:spLocks noGrp="1"/>
-          </p:cNvSpPr>
-          <p:nvPr>
-            <p:ph type="title"/>
-          </p:nvPr>
-        </p:nvSpPr>
-        <p:spPr/>
-        <p:txBody>
-          <a:bodyPr/>
-          <a:lstStyle/>
-          <a:p>
-            <a:pPr lvl="0" marL="0" indent="0">
-              <a:buNone/>
-            </a:pPr>
-            <a:r>
-              <a:rPr/>
-              <a:t>Here’s</a:t>
-            </a:r>
-            <a:r>
-              <a:rPr/>
-              <a:t> </a:t>
-            </a:r>
-            <a:r>
-              <a:rPr/>
-              <a:t>the</a:t>
-            </a:r>
-            <a:r>
-              <a:rPr/>
-              <a:t> </a:t>
-            </a:r>
-            <a:r>
-              <a:rPr/>
-              <a:t>result</a:t>
-            </a:r>
-            <a:r>
-              <a:rPr/>
-              <a:t> </a:t>
-            </a:r>
-            <a:r>
-              <a:rPr/>
-              <a:t>in</a:t>
-            </a:r>
-            <a:r>
-              <a:rPr/>
-              <a:t> </a:t>
-            </a:r>
-            <a:r>
-              <a:rPr/>
-              <a:t>R.</a:t>
-            </a:r>
-          </a:p>
-        </p:txBody>
-      </p:sp>
-      <p:pic>
-        <p:nvPicPr>
-          <p:cNvPr descr="../images/r-size-living-area.png" id="0" name="Picture 1"/>
-          <p:cNvPicPr>
-            <a:picLocks noGrp="1" noChangeAspect="1"/>
-          </p:cNvPicPr>
-          <p:nvPr/>
-        </p:nvPicPr>
-        <p:blipFill>
-          <a:blip r:embed="rId2"/>
-          <a:stretch>
-            <a:fillRect/>
-          </a:stretch>
-        </p:blipFill>
-        <p:spPr bwMode="auto">
-          <a:xfrm>
-            <a:off x="2311400" y="1600200"/>
-            <a:ext cx="4521200" cy="4521200"/>
-          </a:xfrm>
-          <a:prstGeom prst="rect">
-            <a:avLst/>
-          </a:prstGeom>
-          <a:noFill/>
-          <a:ln w="9525">
-            <a:noFill/>
-            <a:headEnd/>
-            <a:tailEnd/>
-          </a:ln>
-        </p:spPr>
-      </p:pic>
-    </p:spTree>
-  </p:cSld>
-</p:sld>
-</file>
-
-<file path=ppt/slides/slide29.xml><?xml version="1.0" encoding="utf-8"?>
-<p:sld xmlns:a="http://schemas.openxmlformats.org/drawingml/2006/main" xmlns:r="http://schemas.openxmlformats.org/officeDocument/2006/relationships" xmlns:p="http://schemas.openxmlformats.org/presentationml/2006/main">
-  <p:cSld>
-    <p:spTree>
-      <p:nvGrpSpPr>
-        <p:cNvPr id="1" name=""/>
-        <p:cNvGrpSpPr/>
-        <p:nvPr/>
-      </p:nvGrpSpPr>
-      <p:grpSpPr>
-        <a:xfrm>
-          <a:off x="0" y="0"/>
-          <a:ext cx="0" cy="0"/>
-          <a:chOff x="0" y="0"/>
-          <a:chExt cx="0" cy="0"/>
-        </a:xfrm>
-      </p:grpSpPr>
-      <p:sp>
-        <p:nvSpPr>
-          <p:cNvPr id="2" name="Title 1"/>
-          <p:cNvSpPr>
-            <a:spLocks noGrp="1"/>
-          </p:cNvSpPr>
-          <p:nvPr>
-            <p:ph type="title"/>
-          </p:nvPr>
-        </p:nvSpPr>
-        <p:spPr/>
-        <p:txBody>
-          <a:bodyPr/>
-          <a:lstStyle/>
-          <a:p>
-            <a:pPr lvl="0" marL="0" indent="0">
-              <a:buNone/>
-            </a:pPr>
-            <a:r>
-              <a:rPr/>
-              <a:t>Here’s</a:t>
-            </a:r>
-            <a:r>
-              <a:rPr/>
-              <a:t> </a:t>
-            </a:r>
-            <a:r>
-              <a:rPr/>
-              <a:t>the</a:t>
-            </a:r>
-            <a:r>
-              <a:rPr/>
-              <a:t> </a:t>
-            </a:r>
-            <a:r>
-              <a:rPr/>
-              <a:t>result</a:t>
-            </a:r>
-            <a:r>
-              <a:rPr/>
-              <a:t> </a:t>
-            </a:r>
-            <a:r>
-              <a:rPr/>
-              <a:t>in</a:t>
-            </a:r>
-            <a:r>
-              <a:rPr/>
-              <a:t> </a:t>
-            </a:r>
-            <a:r>
-              <a:rPr/>
-              <a:t>Tableau.</a:t>
-            </a:r>
-          </a:p>
-        </p:txBody>
-      </p:sp>
-      <p:pic>
-        <p:nvPicPr>
-          <p:cNvPr descr="../images/tableau/size-living-area.png" id="0" name="Picture 1"/>
-          <p:cNvPicPr>
-            <a:picLocks noGrp="1" noChangeAspect="1"/>
-          </p:cNvPicPr>
-          <p:nvPr/>
-        </p:nvPicPr>
-        <p:blipFill>
-          <a:blip r:embed="rId2"/>
-          <a:stretch>
-            <a:fillRect/>
-          </a:stretch>
-        </p:blipFill>
-        <p:spPr bwMode="auto">
-          <a:xfrm>
-            <a:off x="558800" y="1600200"/>
-            <a:ext cx="8026400" cy="4013200"/>
-          </a:xfrm>
-          <a:prstGeom prst="rect">
-            <a:avLst/>
-          </a:prstGeom>
-          <a:noFill/>
-          <a:ln w="9525">
-            <a:noFill/>
-            <a:headEnd/>
-            <a:tailEnd/>
-          </a:ln>
-        </p:spPr>
-      </p:pic>
-      <p:sp>
-        <p:nvSpPr>
-          <p:cNvPr id="1" name="TextBox 3"/>
-          <p:cNvSpPr txBox="1"/>
-          <p:nvPr/>
-        </p:nvSpPr>
-        <p:spPr>
-          <a:xfrm>
-            <a:off x="457200" y="5613400"/>
-            <a:ext cx="8229600" cy="508000"/>
-          </a:xfrm>
-          <a:prstGeom prst="rect">
-            <a:avLst/>
-          </a:prstGeom>
-          <a:noFill/>
-        </p:spPr>
-        <p:txBody>
-          <a:bodyPr/>
-          <a:lstStyle/>
-          <a:p>
-            <a:pPr lvl="0" marL="0" indent="0" algn="ctr">
-              <a:buNone/>
-            </a:pPr>
-            <a:r>
-              <a:rPr/>
-              <a:t>Visualizaion</a:t>
-            </a:r>
-            <a:r>
-              <a:rPr/>
-              <a:t> </a:t>
-            </a:r>
-            <a:r>
-              <a:rPr/>
-              <a:t>using</a:t>
-            </a:r>
-            <a:r>
-              <a:rPr/>
-              <a:t> </a:t>
-            </a:r>
-            <a:r>
-              <a:rPr/>
-              <a:t>Living.Area</a:t>
-            </a:r>
-            <a:r>
-              <a:rPr/>
-              <a:t> </a:t>
-            </a:r>
-            <a:r>
-              <a:rPr/>
-              <a:t>as</a:t>
-            </a:r>
-            <a:r>
-              <a:rPr/>
-              <a:t> </a:t>
-            </a:r>
-            <a:r>
-              <a:rPr/>
-              <a:t>the</a:t>
-            </a:r>
-            <a:r>
-              <a:rPr/>
-              <a:t> </a:t>
-            </a:r>
-            <a:r>
-              <a:rPr/>
-              <a:t>size</a:t>
-            </a:r>
-          </a:p>
-        </p:txBody>
-      </p:sp>
-    </p:spTree>
-  </p:cSld>
-</p:sld>
-</file>
-
-<file path=ppt/slides/slide3.xml><?xml version="1.0" encoding="utf-8"?>
-<p:sld xmlns:a="http://schemas.openxmlformats.org/drawingml/2006/main" xmlns:r="http://schemas.openxmlformats.org/officeDocument/2006/relationships" xmlns:p="http://schemas.openxmlformats.org/presentationml/2006/main">
-  <p:cSld>
-    <p:spTree>
-      <p:nvGrpSpPr>
-        <p:cNvPr id="1" name=""/>
-        <p:cNvGrpSpPr/>
-        <p:nvPr/>
-      </p:nvGrpSpPr>
-      <p:grpSpPr>
-        <a:xfrm>
-          <a:off x="0" y="0"/>
-          <a:ext cx="0" cy="0"/>
-          <a:chOff x="0" y="0"/>
-          <a:chExt cx="0" cy="0"/>
-        </a:xfrm>
-      </p:grpSpPr>
-      <p:sp>
-        <p:nvSpPr>
-          <p:cNvPr id="2" name="Title 1"/>
-          <p:cNvSpPr>
-            <a:spLocks noGrp="1"/>
-          </p:cNvSpPr>
-          <p:nvPr>
-            <p:ph type="title"/>
-          </p:nvPr>
-        </p:nvSpPr>
-        <p:spPr/>
-        <p:txBody>
-          <a:bodyPr/>
-          <a:lstStyle/>
-          <a:p>
-            <a:pPr lvl="0" marL="0" indent="0">
-              <a:buNone/>
-            </a:pPr>
-            <a:r>
-              <a:rPr/>
-              <a:t>Changing</a:t>
-            </a:r>
-            <a:r>
-              <a:rPr/>
-              <a:t> </a:t>
-            </a:r>
-            <a:r>
-              <a:rPr/>
-              <a:t>default</a:t>
-            </a:r>
-            <a:r>
-              <a:rPr/>
-              <a:t> </a:t>
-            </a:r>
-            <a:r>
-              <a:rPr/>
-              <a:t>options</a:t>
-            </a:r>
-          </a:p>
-        </p:txBody>
-      </p:sp>
-      <p:sp>
-        <p:nvSpPr>
-          <p:cNvPr id="3" name="Content Placeholder 2"/>
-          <p:cNvSpPr>
-            <a:spLocks noGrp="1"/>
-          </p:cNvSpPr>
-          <p:nvPr>
-            <p:ph idx="1"/>
-          </p:nvPr>
-        </p:nvSpPr>
-        <p:spPr/>
-        <p:txBody>
-          <a:bodyPr/>
-          <a:lstStyle/>
-          <a:p>
-            <a:pPr lvl="1"/>
-            <a:r>
-              <a:rPr/>
-              <a:t>Python code</a:t>
-            </a:r>
-          </a:p>
-          <a:p>
-            <a:pPr lvl="0" marL="1270000" indent="0">
-              <a:buNone/>
-            </a:pPr>
-            <a:r>
-              <a:rPr sz="1800">
-                <a:latin typeface="Courier"/>
-              </a:rPr>
-              <a:t>.mark_point(shape="square", color="green").</a:t>
-            </a:r>
-          </a:p>
-          <a:p>
-            <a:pPr lvl="1"/>
-            <a:r>
-              <a:rPr/>
-              <a:t>R code</a:t>
-            </a:r>
-          </a:p>
-          <a:p>
-            <a:pPr lvl="0" marL="1270000" indent="0">
-              <a:buNone/>
-            </a:pPr>
-            <a:r>
-              <a:rPr sz="1800">
-                <a:latin typeface="Courier"/>
-              </a:rPr>
-              <a:t>geom_point(shape="square", color="green")</a:t>
-            </a:r>
-          </a:p>
-          <a:p>
-            <a:pPr lvl="1"/>
-            <a:r>
-              <a:rPr/>
-              <a:t>Tableau</a:t>
-            </a:r>
-          </a:p>
-          <a:p>
-            <a:pPr lvl="2"/>
-            <a:r>
-              <a:rPr/>
-              <a:t>(Drag and drop)</a:t>
-            </a:r>
-          </a:p>
-        </p:txBody>
-      </p:sp>
-    </p:spTree>
-  </p:cSld>
-</p:sld>
-</file>
-
-<file path=ppt/slides/slide30.xml><?xml version="1.0" encoding="utf-8"?>
+<file path=ppt/slides/slide18.xml><?xml version="1.0" encoding="utf-8"?>
 <p:sld xmlns:a="http://schemas.openxmlformats.org/drawingml/2006/main" xmlns:r="http://schemas.openxmlformats.org/officeDocument/2006/relationships" xmlns:p="http://schemas.openxmlformats.org/presentationml/2006/main">
   <p:cSld>
     <p:spTree>
@@ -11324,7 +8799,7 @@
 </p:sld>
 </file>
 
-<file path=ppt/slides/slide31.xml><?xml version="1.0" encoding="utf-8"?>
+<file path=ppt/slides/slide19.xml><?xml version="1.0" encoding="utf-8"?>
 <p:sld xmlns:a="http://schemas.openxmlformats.org/drawingml/2006/main" xmlns:r="http://schemas.openxmlformats.org/officeDocument/2006/relationships" xmlns:p="http://schemas.openxmlformats.org/presentationml/2006/main">
   <p:cSld>
     <p:spTree>
@@ -11535,7 +9010,7 @@
 </p:sld>
 </file>
 
-<file path=ppt/slides/slide32.xml><?xml version="1.0" encoding="utf-8"?>
+<file path=ppt/slides/slide2.xml><?xml version="1.0" encoding="utf-8"?>
 <p:sld xmlns:a="http://schemas.openxmlformats.org/drawingml/2006/main" xmlns:r="http://schemas.openxmlformats.org/officeDocument/2006/relationships" xmlns:p="http://schemas.openxmlformats.org/presentationml/2006/main">
   <p:cSld>
     <p:spTree>
@@ -11572,31 +9047,23 @@
             </a:pPr>
             <a:r>
               <a:rPr/>
-              <a:t>Basic</a:t>
-            </a:r>
-            <a:r>
-              <a:rPr/>
-              <a:t> </a:t>
-            </a:r>
-            <a:r>
-              <a:rPr/>
-              <a:t>exercise</a:t>
-            </a:r>
-            <a:r>
-              <a:rPr/>
-              <a:t> </a:t>
-            </a:r>
-            <a:r>
-              <a:rPr/>
-              <a:t>-</a:t>
-            </a:r>
-            <a:r>
-              <a:rPr/>
-              <a:t> </a:t>
-            </a:r>
-            <a:r>
-              <a:rPr/>
-              <a:t>color</a:t>
+              <a:t>Review</a:t>
+            </a:r>
+            <a:r>
+              <a:rPr/>
+              <a:t> </a:t>
+            </a:r>
+            <a:r>
+              <a:rPr/>
+              <a:t>basic</a:t>
+            </a:r>
+            <a:r>
+              <a:rPr/>
+              <a:t> </a:t>
+            </a:r>
+            <a:r>
+              <a:rPr/>
+              <a:t>scatterplot</a:t>
             </a:r>
           </a:p>
         </p:txBody>
@@ -11619,14 +9086,53 @@
             <a:pPr lvl="1"/>
             <a:r>
               <a:rPr/>
-              <a:t>Use the Saratoga housing data set.</a:t>
+              <a:t>Python code</a:t>
+            </a:r>
+          </a:p>
+          <a:p>
+            <a:pPr lvl="0" marL="1270000" indent="0">
+              <a:buNone/>
+            </a:pPr>
+            <a:r>
+              <a:rPr sz="1800">
+                <a:latin typeface="Courier"/>
+              </a:rPr>
+              <a:t>ch = alt.Chart(df).mark_point().encode(
+    x='Age', y='Price'
+)</a:t>
             </a:r>
           </a:p>
           <a:p>
             <a:pPr lvl="1"/>
             <a:r>
               <a:rPr/>
-              <a:t>Draw a plot where the location is x=Age and y=Price and the color represents the number of bathrooms.</a:t>
+              <a:t>R code</a:t>
+            </a:r>
+          </a:p>
+          <a:p>
+            <a:pPr lvl="0" marL="1270000" indent="0">
+              <a:buNone/>
+            </a:pPr>
+            <a:r>
+              <a:rPr sz="1800">
+                <a:latin typeface="Courier"/>
+              </a:rPr>
+              <a:t>ggplot(saratoga_houses, aes(x=Age, y=Price)) +
+  geom_point()</a:t>
+            </a:r>
+          </a:p>
+          <a:p>
+            <a:pPr lvl="1"/>
+            <a:r>
+              <a:rPr/>
+              <a:t>Tableau</a:t>
+            </a:r>
+          </a:p>
+          <a:p>
+            <a:pPr lvl="2"/>
+            <a:r>
+              <a:rPr/>
+              <a:t>(Drag and drop)</a:t>
             </a:r>
           </a:p>
         </p:txBody>
@@ -11636,7 +9142,7 @@
 </p:sld>
 </file>
 
-<file path=ppt/slides/slide33.xml><?xml version="1.0" encoding="utf-8"?>
+<file path=ppt/slides/slide20.xml><?xml version="1.0" encoding="utf-8"?>
 <p:sld xmlns:a="http://schemas.openxmlformats.org/drawingml/2006/main" xmlns:r="http://schemas.openxmlformats.org/officeDocument/2006/relationships" xmlns:p="http://schemas.openxmlformats.org/presentationml/2006/main">
   <p:cSld>
     <p:spTree>
@@ -11737,7 +9243,7 @@
 </p:sld>
 </file>
 
-<file path=ppt/slides/slide34.xml><?xml version="1.0" encoding="utf-8"?>
+<file path=ppt/slides/slide3.xml><?xml version="1.0" encoding="utf-8"?>
 <p:sld xmlns:a="http://schemas.openxmlformats.org/drawingml/2006/main" xmlns:r="http://schemas.openxmlformats.org/officeDocument/2006/relationships" xmlns:p="http://schemas.openxmlformats.org/presentationml/2006/main">
   <p:cSld>
     <p:spTree>
@@ -11774,31 +9280,23 @@
             </a:pPr>
             <a:r>
               <a:rPr/>
-              <a:t>Here’s</a:t>
-            </a:r>
-            <a:r>
-              <a:rPr/>
-              <a:t> </a:t>
-            </a:r>
-            <a:r>
-              <a:rPr/>
-              <a:t>the</a:t>
-            </a:r>
-            <a:r>
-              <a:rPr/>
-              <a:t> </a:t>
-            </a:r>
-            <a:r>
-              <a:rPr/>
-              <a:t>Python</a:t>
-            </a:r>
-            <a:r>
-              <a:rPr/>
-              <a:t> </a:t>
-            </a:r>
-            <a:r>
-              <a:rPr/>
-              <a:t>code.</a:t>
+              <a:t>Changing</a:t>
+            </a:r>
+            <a:r>
+              <a:rPr/>
+              <a:t> </a:t>
+            </a:r>
+            <a:r>
+              <a:rPr/>
+              <a:t>default</a:t>
+            </a:r>
+            <a:r>
+              <a:rPr/>
+              <a:t> </a:t>
+            </a:r>
+            <a:r>
+              <a:rPr/>
+              <a:t>options</a:t>
             </a:r>
           </a:p>
         </p:txBody>
@@ -11817,6 +9315,13 @@
         <p:txBody>
           <a:bodyPr/>
           <a:lstStyle/>
+          <a:p>
+            <a:pPr lvl="1"/>
+            <a:r>
+              <a:rPr/>
+              <a:t>Python code</a:t>
+            </a:r>
+          </a:p>
           <a:p>
             <a:pPr lvl="0" marL="1270000" indent="0">
               <a:buNone/>
@@ -11825,276 +9330,16 @@
               <a:rPr sz="1800">
                 <a:latin typeface="Courier"/>
               </a:rPr>
-              <a:t>ch2 = alt.Chart(df).mark_point().encode(
-  x="Age", y="Price", color="Baths")</a:t>
-            </a:r>
-          </a:p>
-        </p:txBody>
-      </p:sp>
-    </p:spTree>
-  </p:cSld>
-</p:sld>
-</file>
-
-<file path=ppt/slides/slide35.xml><?xml version="1.0" encoding="utf-8"?>
-<p:sld xmlns:a="http://schemas.openxmlformats.org/drawingml/2006/main" xmlns:r="http://schemas.openxmlformats.org/officeDocument/2006/relationships" xmlns:p="http://schemas.openxmlformats.org/presentationml/2006/main">
-  <p:cSld>
-    <p:spTree>
-      <p:nvGrpSpPr>
-        <p:cNvPr id="1" name=""/>
-        <p:cNvGrpSpPr/>
-        <p:nvPr/>
-      </p:nvGrpSpPr>
-      <p:grpSpPr>
-        <a:xfrm>
-          <a:off x="0" y="0"/>
-          <a:ext cx="0" cy="0"/>
-          <a:chOff x="0" y="0"/>
-          <a:chExt cx="0" cy="0"/>
-        </a:xfrm>
-      </p:grpSpPr>
-      <p:sp>
-        <p:nvSpPr>
-          <p:cNvPr id="2" name="Title 1"/>
-          <p:cNvSpPr>
-            <a:spLocks noGrp="1"/>
-          </p:cNvSpPr>
-          <p:nvPr>
-            <p:ph type="title"/>
-          </p:nvPr>
-        </p:nvSpPr>
-        <p:spPr/>
-        <p:txBody>
-          <a:bodyPr/>
-          <a:lstStyle/>
-          <a:p>
-            <a:pPr lvl="0" marL="0" indent="0">
-              <a:buNone/>
-            </a:pPr>
-            <a:r>
-              <a:rPr/>
-              <a:t>Here’s</a:t>
-            </a:r>
-            <a:r>
-              <a:rPr/>
-              <a:t> </a:t>
-            </a:r>
-            <a:r>
-              <a:rPr/>
-              <a:t>the</a:t>
-            </a:r>
-            <a:r>
-              <a:rPr/>
-              <a:t> </a:t>
-            </a:r>
-            <a:r>
-              <a:rPr/>
-              <a:t>result</a:t>
-            </a:r>
-            <a:r>
-              <a:rPr/>
-              <a:t> </a:t>
-            </a:r>
-            <a:r>
-              <a:rPr/>
-              <a:t>in</a:t>
-            </a:r>
-            <a:r>
-              <a:rPr/>
-              <a:t> </a:t>
-            </a:r>
-            <a:r>
-              <a:rPr/>
-              <a:t>Python</a:t>
-            </a:r>
-          </a:p>
-        </p:txBody>
-      </p:sp>
-      <p:pic>
-        <p:nvPicPr>
-          <p:cNvPr descr="../images/python/python-basic-exercise-color.png" id="0" name="Picture 1"/>
-          <p:cNvPicPr>
-            <a:picLocks noGrp="1" noChangeAspect="1"/>
-          </p:cNvPicPr>
-          <p:nvPr/>
-        </p:nvPicPr>
-        <p:blipFill>
-          <a:blip r:embed="rId2"/>
-          <a:stretch>
-            <a:fillRect/>
-          </a:stretch>
-        </p:blipFill>
-        <p:spPr bwMode="auto">
-          <a:xfrm>
-            <a:off x="2108200" y="1600200"/>
-            <a:ext cx="4914900" cy="4013200"/>
-          </a:xfrm>
-          <a:prstGeom prst="rect">
-            <a:avLst/>
-          </a:prstGeom>
-          <a:noFill/>
-          <a:ln w="9525">
-            <a:noFill/>
-            <a:headEnd/>
-            <a:tailEnd/>
-          </a:ln>
-        </p:spPr>
-      </p:pic>
-      <p:sp>
-        <p:nvSpPr>
-          <p:cNvPr id="1" name="TextBox 3"/>
-          <p:cNvSpPr txBox="1"/>
-          <p:nvPr/>
-        </p:nvSpPr>
-        <p:spPr>
-          <a:xfrm>
-            <a:off x="457200" y="5613400"/>
-            <a:ext cx="8229600" cy="508000"/>
-          </a:xfrm>
-          <a:prstGeom prst="rect">
-            <a:avLst/>
-          </a:prstGeom>
-          <a:noFill/>
-        </p:spPr>
-        <p:txBody>
-          <a:bodyPr/>
-          <a:lstStyle/>
-          <a:p>
-            <a:pPr lvl="0" marL="0" indent="0" algn="ctr">
-              <a:buNone/>
-            </a:pPr>
-            <a:r>
-              <a:rPr/>
-              <a:t>Python</a:t>
-            </a:r>
-            <a:r>
-              <a:rPr/>
-              <a:t> </a:t>
-            </a:r>
-            <a:r>
-              <a:rPr/>
-              <a:t>scatterplot</a:t>
-            </a:r>
-            <a:r>
-              <a:rPr/>
-              <a:t> </a:t>
-            </a:r>
-            <a:r>
-              <a:rPr/>
-              <a:t>mapping</a:t>
-            </a:r>
-            <a:r>
-              <a:rPr/>
-              <a:t> </a:t>
-            </a:r>
-            <a:r>
-              <a:rPr/>
-              <a:t>bathrooms</a:t>
-            </a:r>
-            <a:r>
-              <a:rPr/>
-              <a:t> </a:t>
-            </a:r>
-            <a:r>
-              <a:rPr/>
-              <a:t>to</a:t>
-            </a:r>
-            <a:r>
-              <a:rPr/>
-              <a:t> </a:t>
-            </a:r>
-            <a:r>
-              <a:rPr/>
-              <a:t>color</a:t>
-            </a:r>
-          </a:p>
-        </p:txBody>
-      </p:sp>
-    </p:spTree>
-  </p:cSld>
-</p:sld>
-</file>
-
-<file path=ppt/slides/slide36.xml><?xml version="1.0" encoding="utf-8"?>
-<p:sld xmlns:a="http://schemas.openxmlformats.org/drawingml/2006/main" xmlns:r="http://schemas.openxmlformats.org/officeDocument/2006/relationships" xmlns:p="http://schemas.openxmlformats.org/presentationml/2006/main">
-  <p:cSld>
-    <p:spTree>
-      <p:nvGrpSpPr>
-        <p:cNvPr id="1" name=""/>
-        <p:cNvGrpSpPr/>
-        <p:nvPr/>
-      </p:nvGrpSpPr>
-      <p:grpSpPr>
-        <a:xfrm>
-          <a:off x="0" y="0"/>
-          <a:ext cx="0" cy="0"/>
-          <a:chOff x="0" y="0"/>
-          <a:chExt cx="0" cy="0"/>
-        </a:xfrm>
-      </p:grpSpPr>
-      <p:sp>
-        <p:nvSpPr>
-          <p:cNvPr id="2" name="Title 1"/>
-          <p:cNvSpPr>
-            <a:spLocks noGrp="1"/>
-          </p:cNvSpPr>
-          <p:nvPr>
-            <p:ph type="title"/>
-          </p:nvPr>
-        </p:nvSpPr>
-        <p:spPr/>
-        <p:txBody>
-          <a:bodyPr/>
-          <a:lstStyle/>
-          <a:p>
-            <a:pPr lvl="0" marL="0" indent="0">
-              <a:buNone/>
-            </a:pPr>
-            <a:r>
-              <a:rPr/>
-              <a:t>Here’s</a:t>
-            </a:r>
-            <a:r>
-              <a:rPr/>
-              <a:t> </a:t>
-            </a:r>
-            <a:r>
-              <a:rPr/>
-              <a:t>the</a:t>
-            </a:r>
-            <a:r>
-              <a:rPr/>
-              <a:t> </a:t>
-            </a:r>
-            <a:r>
-              <a:rPr/>
-              <a:t>R</a:t>
-            </a:r>
-            <a:r>
-              <a:rPr/>
-              <a:t> </a:t>
-            </a:r>
-            <a:r>
-              <a:rPr/>
-              <a:t>code.</a:t>
-            </a:r>
-          </a:p>
-        </p:txBody>
-      </p:sp>
-      <p:sp>
-        <p:nvSpPr>
-          <p:cNvPr id="3" name="Content Placeholder 2"/>
-          <p:cNvSpPr>
-            <a:spLocks noGrp="1"/>
-          </p:cNvSpPr>
-          <p:nvPr>
-            <p:ph idx="1"/>
-          </p:nvPr>
-        </p:nvSpPr>
-        <p:spPr/>
-        <p:txBody>
-          <a:bodyPr/>
-          <a:lstStyle/>
+              <a:t>.mark_point(shape="square", color="green").</a:t>
+            </a:r>
+          </a:p>
+          <a:p>
+            <a:pPr lvl="1"/>
+            <a:r>
+              <a:rPr/>
+              <a:t>R code</a:t>
+            </a:r>
+          </a:p>
           <a:p>
             <a:pPr lvl="0" marL="1270000" indent="0">
               <a:buNone/>
@@ -12103,366 +9348,21 @@
               <a:rPr sz="1800">
                 <a:latin typeface="Courier"/>
               </a:rPr>
-              <a:t>ggplot(saratoga_houses, aes(x=Age, y=Price)) + 
-  geom_point(aes(color=factor(Bathrooms)))</a:t>
-            </a:r>
-          </a:p>
-        </p:txBody>
-      </p:sp>
-    </p:spTree>
-  </p:cSld>
-</p:sld>
-</file>
-
-<file path=ppt/slides/slide37.xml><?xml version="1.0" encoding="utf-8"?>
-<p:sld xmlns:a="http://schemas.openxmlformats.org/drawingml/2006/main" xmlns:r="http://schemas.openxmlformats.org/officeDocument/2006/relationships" xmlns:p="http://schemas.openxmlformats.org/presentationml/2006/main">
-  <p:cSld>
-    <p:spTree>
-      <p:nvGrpSpPr>
-        <p:cNvPr id="1" name=""/>
-        <p:cNvGrpSpPr/>
-        <p:nvPr/>
-      </p:nvGrpSpPr>
-      <p:grpSpPr>
-        <a:xfrm>
-          <a:off x="0" y="0"/>
-          <a:ext cx="0" cy="0"/>
-          <a:chOff x="0" y="0"/>
-          <a:chExt cx="0" cy="0"/>
-        </a:xfrm>
-      </p:grpSpPr>
-      <p:sp>
-        <p:nvSpPr>
-          <p:cNvPr id="2" name="Title 1"/>
-          <p:cNvSpPr>
-            <a:spLocks noGrp="1"/>
-          </p:cNvSpPr>
-          <p:nvPr>
-            <p:ph type="title"/>
-          </p:nvPr>
-        </p:nvSpPr>
-        <p:spPr/>
-        <p:txBody>
-          <a:bodyPr/>
-          <a:lstStyle/>
-          <a:p>
-            <a:pPr lvl="0" marL="0" indent="0">
-              <a:buNone/>
-            </a:pPr>
-            <a:r>
-              <a:rPr/>
-              <a:t>Here’s</a:t>
-            </a:r>
-            <a:r>
-              <a:rPr/>
-              <a:t> </a:t>
-            </a:r>
-            <a:r>
-              <a:rPr/>
-              <a:t>the</a:t>
-            </a:r>
-            <a:r>
-              <a:rPr/>
-              <a:t> </a:t>
-            </a:r>
-            <a:r>
-              <a:rPr/>
-              <a:t>result</a:t>
-            </a:r>
-            <a:r>
-              <a:rPr/>
-              <a:t> </a:t>
-            </a:r>
-            <a:r>
-              <a:rPr/>
-              <a:t>in</a:t>
-            </a:r>
-            <a:r>
-              <a:rPr/>
-              <a:t> </a:t>
-            </a:r>
-            <a:r>
-              <a:rPr/>
-              <a:t>R</a:t>
-            </a:r>
-          </a:p>
-        </p:txBody>
-      </p:sp>
-      <p:pic>
-        <p:nvPicPr>
-          <p:cNvPr descr="../images/r/bathroom-colors.png" id="0" name="Picture 1"/>
-          <p:cNvPicPr>
-            <a:picLocks noGrp="1" noChangeAspect="1"/>
-          </p:cNvPicPr>
-          <p:nvPr/>
-        </p:nvPicPr>
-        <p:blipFill>
-          <a:blip r:embed="rId2"/>
-          <a:stretch>
-            <a:fillRect/>
-          </a:stretch>
-        </p:blipFill>
-        <p:spPr bwMode="auto">
-          <a:xfrm>
-            <a:off x="2565400" y="1600200"/>
-            <a:ext cx="4013200" cy="4013200"/>
-          </a:xfrm>
-          <a:prstGeom prst="rect">
-            <a:avLst/>
-          </a:prstGeom>
-          <a:noFill/>
-          <a:ln w="9525">
-            <a:noFill/>
-            <a:headEnd/>
-            <a:tailEnd/>
-          </a:ln>
-        </p:spPr>
-      </p:pic>
-      <p:sp>
-        <p:nvSpPr>
-          <p:cNvPr id="1" name="TextBox 3"/>
-          <p:cNvSpPr txBox="1"/>
-          <p:nvPr/>
-        </p:nvSpPr>
-        <p:spPr>
-          <a:xfrm>
-            <a:off x="457200" y="5613400"/>
-            <a:ext cx="8229600" cy="508000"/>
-          </a:xfrm>
-          <a:prstGeom prst="rect">
-            <a:avLst/>
-          </a:prstGeom>
-          <a:noFill/>
-        </p:spPr>
-        <p:txBody>
-          <a:bodyPr/>
-          <a:lstStyle/>
-          <a:p>
-            <a:pPr lvl="0" marL="0" indent="0" algn="ctr">
-              <a:buNone/>
-            </a:pPr>
-            <a:r>
-              <a:rPr/>
-              <a:t>R</a:t>
-            </a:r>
-            <a:r>
-              <a:rPr/>
-              <a:t> </a:t>
-            </a:r>
-            <a:r>
-              <a:rPr/>
-              <a:t>scatterplot</a:t>
-            </a:r>
-            <a:r>
-              <a:rPr/>
-              <a:t> </a:t>
-            </a:r>
-            <a:r>
-              <a:rPr/>
-              <a:t>mapping</a:t>
-            </a:r>
-            <a:r>
-              <a:rPr/>
-              <a:t> </a:t>
-            </a:r>
-            <a:r>
-              <a:rPr/>
-              <a:t>bathrooms</a:t>
-            </a:r>
-            <a:r>
-              <a:rPr/>
-              <a:t> </a:t>
-            </a:r>
-            <a:r>
-              <a:rPr/>
-              <a:t>to</a:t>
-            </a:r>
-            <a:r>
-              <a:rPr/>
-              <a:t> </a:t>
-            </a:r>
-            <a:r>
-              <a:rPr/>
-              <a:t>color</a:t>
-            </a:r>
-          </a:p>
-        </p:txBody>
-      </p:sp>
-    </p:spTree>
-  </p:cSld>
-</p:sld>
-</file>
-
-<file path=ppt/slides/slide38.xml><?xml version="1.0" encoding="utf-8"?>
-<p:sld xmlns:a="http://schemas.openxmlformats.org/drawingml/2006/main" xmlns:r="http://schemas.openxmlformats.org/officeDocument/2006/relationships" xmlns:p="http://schemas.openxmlformats.org/presentationml/2006/main">
-  <p:cSld>
-    <p:spTree>
-      <p:nvGrpSpPr>
-        <p:cNvPr id="1" name=""/>
-        <p:cNvGrpSpPr/>
-        <p:nvPr/>
-      </p:nvGrpSpPr>
-      <p:grpSpPr>
-        <a:xfrm>
-          <a:off x="0" y="0"/>
-          <a:ext cx="0" cy="0"/>
-          <a:chOff x="0" y="0"/>
-          <a:chExt cx="0" cy="0"/>
-        </a:xfrm>
-      </p:grpSpPr>
-      <p:sp>
-        <p:nvSpPr>
-          <p:cNvPr id="2" name="Title 1"/>
-          <p:cNvSpPr>
-            <a:spLocks noGrp="1"/>
-          </p:cNvSpPr>
-          <p:nvPr>
-            <p:ph type="title"/>
-          </p:nvPr>
-        </p:nvSpPr>
-        <p:spPr/>
-        <p:txBody>
-          <a:bodyPr/>
-          <a:lstStyle/>
-          <a:p>
-            <a:pPr lvl="0" marL="0" indent="0">
-              <a:buNone/>
-            </a:pPr>
-            <a:r>
-              <a:rPr/>
-              <a:t>Here’s</a:t>
-            </a:r>
-            <a:r>
-              <a:rPr/>
-              <a:t> </a:t>
-            </a:r>
-            <a:r>
-              <a:rPr/>
-              <a:t>the</a:t>
-            </a:r>
-            <a:r>
-              <a:rPr/>
-              <a:t> </a:t>
-            </a:r>
-            <a:r>
-              <a:rPr/>
-              <a:t>result</a:t>
-            </a:r>
-            <a:r>
-              <a:rPr/>
-              <a:t> </a:t>
-            </a:r>
-            <a:r>
-              <a:rPr/>
-              <a:t>in</a:t>
-            </a:r>
-            <a:r>
-              <a:rPr/>
-              <a:t> </a:t>
-            </a:r>
-            <a:r>
-              <a:rPr/>
-              <a:t>Tableau.</a:t>
-            </a:r>
-          </a:p>
-        </p:txBody>
-      </p:sp>
-      <p:pic>
-        <p:nvPicPr>
-          <p:cNvPr descr="../images/tableau/basic-exercise-color.png" id="0" name="Picture 1"/>
-          <p:cNvPicPr>
-            <a:picLocks noGrp="1" noChangeAspect="1"/>
-          </p:cNvPicPr>
-          <p:nvPr/>
-        </p:nvPicPr>
-        <p:blipFill>
-          <a:blip r:embed="rId2"/>
-          <a:stretch>
-            <a:fillRect/>
-          </a:stretch>
-        </p:blipFill>
-        <p:spPr bwMode="auto">
-          <a:xfrm>
-            <a:off x="558800" y="1600200"/>
-            <a:ext cx="8026400" cy="4013200"/>
-          </a:xfrm>
-          <a:prstGeom prst="rect">
-            <a:avLst/>
-          </a:prstGeom>
-          <a:noFill/>
-          <a:ln w="9525">
-            <a:noFill/>
-            <a:headEnd/>
-            <a:tailEnd/>
-          </a:ln>
-        </p:spPr>
-      </p:pic>
-      <p:sp>
-        <p:nvSpPr>
-          <p:cNvPr id="1" name="TextBox 3"/>
-          <p:cNvSpPr txBox="1"/>
-          <p:nvPr/>
-        </p:nvSpPr>
-        <p:spPr>
-          <a:xfrm>
-            <a:off x="457200" y="5613400"/>
-            <a:ext cx="8229600" cy="508000"/>
-          </a:xfrm>
-          <a:prstGeom prst="rect">
-            <a:avLst/>
-          </a:prstGeom>
-          <a:noFill/>
-        </p:spPr>
-        <p:txBody>
-          <a:bodyPr/>
-          <a:lstStyle/>
-          <a:p>
-            <a:pPr lvl="0" marL="0" indent="0" algn="ctr">
-              <a:buNone/>
-            </a:pPr>
+              <a:t>geom_point(shape="square", color="green")</a:t>
+            </a:r>
+          </a:p>
+          <a:p>
+            <a:pPr lvl="1"/>
             <a:r>
               <a:rPr/>
               <a:t>Tableau</a:t>
             </a:r>
-            <a:r>
-              <a:rPr/>
-              <a:t> </a:t>
-            </a:r>
-            <a:r>
-              <a:rPr/>
-              <a:t>scatterplot</a:t>
-            </a:r>
-            <a:r>
-              <a:rPr/>
-              <a:t> </a:t>
-            </a:r>
-            <a:r>
-              <a:rPr/>
-              <a:t>mapping</a:t>
-            </a:r>
-            <a:r>
-              <a:rPr/>
-              <a:t> </a:t>
-            </a:r>
-            <a:r>
-              <a:rPr/>
-              <a:t>Bathrooms</a:t>
-            </a:r>
-            <a:r>
-              <a:rPr/>
-              <a:t> </a:t>
-            </a:r>
-            <a:r>
-              <a:rPr/>
-              <a:t>to</a:t>
-            </a:r>
-            <a:r>
-              <a:rPr/>
-              <a:t> </a:t>
-            </a:r>
-            <a:r>
-              <a:rPr/>
-              <a:t>color</a:t>
+          </a:p>
+          <a:p>
+            <a:pPr lvl="2"/>
+            <a:r>
+              <a:rPr/>
+              <a:t>(Drag and drop)</a:t>
             </a:r>
           </a:p>
         </p:txBody>

</xml_diff>

<commit_message>
Improved font size on examples in data-viz-01
</commit_message>
<xml_diff>
--- a/data-viz-01/component/fundamentals.pptx
+++ b/data-viz-01/component/fundamentals.pptx
@@ -6772,7 +6772,15 @@
             </a:r>
             <a:r>
               <a:rPr/>
-              <a:t>ATTR(Bedrooms).</a:t>
+              <a:t>Dimension</a:t>
+            </a:r>
+            <a:r>
+              <a:rPr/>
+              <a:t> </a:t>
+            </a:r>
+            <a:r>
+              <a:rPr/>
+              <a:t>Categorical.</a:t>
             </a:r>
           </a:p>
         </p:txBody>
@@ -18182,7 +18190,7 @@
               <a:rPr sz="1800">
                 <a:latin typeface="Courier"/>
               </a:rPr>
-              <a:t>ch5 = alt.Chart(df).mark_point().encode(
+              <a:t>ch = alt.Chart(df).mark_point().encode(
       x='Age',y='Price', shape='Bedrooms:N')</a:t>
             </a:r>
           </a:p>

</xml_diff>